<commit_message>
presentation tweaks and added graph-drawing to the estimator class
</commit_message>
<xml_diff>
--- a/presentation/presentation.pptx
+++ b/presentation/presentation.pptx
@@ -5,7 +5,7 @@
     <p:sldMasterId id="2147483648" r:id="rId1"/>
   </p:sldMasterIdLst>
   <p:notesMasterIdLst>
-    <p:notesMasterId r:id="rId17"/>
+    <p:notesMasterId r:id="rId22"/>
   </p:notesMasterIdLst>
   <p:sldIdLst>
     <p:sldId id="256" r:id="rId2"/>
@@ -19,10 +19,15 @@
     <p:sldId id="265" r:id="rId10"/>
     <p:sldId id="267" r:id="rId11"/>
     <p:sldId id="266" r:id="rId12"/>
-    <p:sldId id="269" r:id="rId13"/>
-    <p:sldId id="268" r:id="rId14"/>
-    <p:sldId id="271" r:id="rId15"/>
-    <p:sldId id="270" r:id="rId16"/>
+    <p:sldId id="274" r:id="rId13"/>
+    <p:sldId id="269" r:id="rId14"/>
+    <p:sldId id="278" r:id="rId15"/>
+    <p:sldId id="268" r:id="rId16"/>
+    <p:sldId id="271" r:id="rId17"/>
+    <p:sldId id="270" r:id="rId18"/>
+    <p:sldId id="273" r:id="rId19"/>
+    <p:sldId id="272" r:id="rId20"/>
+    <p:sldId id="275" r:id="rId21"/>
   </p:sldIdLst>
   <p:sldSz cx="9144000" cy="6858000" type="screen4x3"/>
   <p:notesSz cx="6858000" cy="9144000"/>
@@ -206,7 +211,7 @@
           <a:p>
             <a:fld id="{5D0D73BD-20FC-4736-ADD9-20DBEA1999CA}" type="datetimeFigureOut">
               <a:rPr lang="en-US" smtClean="0"/>
-              <a:t>5/4/2015</a:t>
+              <a:t>5/5/2015</a:t>
             </a:fld>
             <a:endParaRPr lang="en-US"/>
           </a:p>
@@ -616,14 +621,6 @@
           <a:bodyPr/>
           <a:lstStyle/>
           <a:p>
-            <a:r>
-              <a:rPr lang="en-US" dirty="0" smtClean="0"/>
-              <a:t>We weren’t even able to reach 90% accuracy with 41%</a:t>
-            </a:r>
-            <a:r>
-              <a:rPr lang="en-US" baseline="0" dirty="0" smtClean="0"/>
-              <a:t> spies!</a:t>
-            </a:r>
             <a:endParaRPr lang="en-US" dirty="0"/>
           </a:p>
         </p:txBody>
@@ -645,7 +642,99 @@
           <a:p>
             <a:fld id="{EC5E2181-E1D3-45AD-B40E-5B84D2792553}" type="slidenum">
               <a:rPr lang="en-US" smtClean="0"/>
-              <a:t>13</a:t>
+              <a:t>9</a:t>
+            </a:fld>
+            <a:endParaRPr lang="en-US"/>
+          </a:p>
+        </p:txBody>
+      </p:sp>
+    </p:spTree>
+    <p:extLst>
+      <p:ext uri="{BB962C8B-B14F-4D97-AF65-F5344CB8AC3E}">
+        <p14:creationId xmlns:p14="http://schemas.microsoft.com/office/powerpoint/2010/main" val="4134050412"/>
+      </p:ext>
+    </p:extLst>
+  </p:cSld>
+  <p:clrMapOvr>
+    <a:masterClrMapping/>
+  </p:clrMapOvr>
+</p:notes>
+</file>
+
+<file path=ppt/notesSlides/notesSlide3.xml><?xml version="1.0" encoding="utf-8"?>
+<p:notes xmlns:a="http://schemas.openxmlformats.org/drawingml/2006/main" xmlns:r="http://schemas.openxmlformats.org/officeDocument/2006/relationships" xmlns:p="http://schemas.openxmlformats.org/presentationml/2006/main">
+  <p:cSld>
+    <p:spTree>
+      <p:nvGrpSpPr>
+        <p:cNvPr id="1" name=""/>
+        <p:cNvGrpSpPr/>
+        <p:nvPr/>
+      </p:nvGrpSpPr>
+      <p:grpSpPr>
+        <a:xfrm>
+          <a:off x="0" y="0"/>
+          <a:ext cx="0" cy="0"/>
+          <a:chOff x="0" y="0"/>
+          <a:chExt cx="0" cy="0"/>
+        </a:xfrm>
+      </p:grpSpPr>
+      <p:sp>
+        <p:nvSpPr>
+          <p:cNvPr id="2" name="Slide Image Placeholder 1"/>
+          <p:cNvSpPr>
+            <a:spLocks noGrp="1" noRot="1" noChangeAspect="1"/>
+          </p:cNvSpPr>
+          <p:nvPr>
+            <p:ph type="sldImg"/>
+          </p:nvPr>
+        </p:nvSpPr>
+        <p:spPr/>
+      </p:sp>
+      <p:sp>
+        <p:nvSpPr>
+          <p:cNvPr id="3" name="Notes Placeholder 2"/>
+          <p:cNvSpPr>
+            <a:spLocks noGrp="1"/>
+          </p:cNvSpPr>
+          <p:nvPr>
+            <p:ph type="body" idx="1"/>
+          </p:nvPr>
+        </p:nvSpPr>
+        <p:spPr/>
+        <p:txBody>
+          <a:bodyPr/>
+          <a:lstStyle/>
+          <a:p>
+            <a:r>
+              <a:rPr lang="en-US" dirty="0" smtClean="0"/>
+              <a:t>We weren’t even able to reach 90% accuracy with 41%</a:t>
+            </a:r>
+            <a:r>
+              <a:rPr lang="en-US" baseline="0" dirty="0" smtClean="0"/>
+              <a:t> spies!</a:t>
+            </a:r>
+            <a:endParaRPr lang="en-US" dirty="0"/>
+          </a:p>
+        </p:txBody>
+      </p:sp>
+      <p:sp>
+        <p:nvSpPr>
+          <p:cNvPr id="4" name="Slide Number Placeholder 3"/>
+          <p:cNvSpPr>
+            <a:spLocks noGrp="1"/>
+          </p:cNvSpPr>
+          <p:nvPr>
+            <p:ph type="sldNum" sz="quarter" idx="10"/>
+          </p:nvPr>
+        </p:nvSpPr>
+        <p:spPr/>
+        <p:txBody>
+          <a:bodyPr/>
+          <a:lstStyle/>
+          <a:p>
+            <a:fld id="{EC5E2181-E1D3-45AD-B40E-5B84D2792553}" type="slidenum">
+              <a:rPr lang="en-US" smtClean="0"/>
+              <a:t>15</a:t>
             </a:fld>
             <a:endParaRPr lang="en-US"/>
           </a:p>
@@ -853,7 +942,7 @@
           <a:p>
             <a:fld id="{25F75D5F-615C-49DE-B9F3-D8BF94771A47}" type="datetimeFigureOut">
               <a:rPr lang="en-US" smtClean="0"/>
-              <a:t>5/4/2015</a:t>
+              <a:t>5/5/2015</a:t>
             </a:fld>
             <a:endParaRPr lang="en-US"/>
           </a:p>
@@ -1023,7 +1112,7 @@
           <a:p>
             <a:fld id="{25F75D5F-615C-49DE-B9F3-D8BF94771A47}" type="datetimeFigureOut">
               <a:rPr lang="en-US" smtClean="0"/>
-              <a:t>5/4/2015</a:t>
+              <a:t>5/5/2015</a:t>
             </a:fld>
             <a:endParaRPr lang="en-US"/>
           </a:p>
@@ -1203,7 +1292,7 @@
           <a:p>
             <a:fld id="{25F75D5F-615C-49DE-B9F3-D8BF94771A47}" type="datetimeFigureOut">
               <a:rPr lang="en-US" smtClean="0"/>
-              <a:t>5/4/2015</a:t>
+              <a:t>5/5/2015</a:t>
             </a:fld>
             <a:endParaRPr lang="en-US"/>
           </a:p>
@@ -1373,7 +1462,7 @@
           <a:p>
             <a:fld id="{25F75D5F-615C-49DE-B9F3-D8BF94771A47}" type="datetimeFigureOut">
               <a:rPr lang="en-US" smtClean="0"/>
-              <a:t>5/4/2015</a:t>
+              <a:t>5/5/2015</a:t>
             </a:fld>
             <a:endParaRPr lang="en-US"/>
           </a:p>
@@ -1619,7 +1708,7 @@
           <a:p>
             <a:fld id="{25F75D5F-615C-49DE-B9F3-D8BF94771A47}" type="datetimeFigureOut">
               <a:rPr lang="en-US" smtClean="0"/>
-              <a:t>5/4/2015</a:t>
+              <a:t>5/5/2015</a:t>
             </a:fld>
             <a:endParaRPr lang="en-US"/>
           </a:p>
@@ -1907,7 +1996,7 @@
           <a:p>
             <a:fld id="{25F75D5F-615C-49DE-B9F3-D8BF94771A47}" type="datetimeFigureOut">
               <a:rPr lang="en-US" smtClean="0"/>
-              <a:t>5/4/2015</a:t>
+              <a:t>5/5/2015</a:t>
             </a:fld>
             <a:endParaRPr lang="en-US"/>
           </a:p>
@@ -2329,7 +2418,7 @@
           <a:p>
             <a:fld id="{25F75D5F-615C-49DE-B9F3-D8BF94771A47}" type="datetimeFigureOut">
               <a:rPr lang="en-US" smtClean="0"/>
-              <a:t>5/4/2015</a:t>
+              <a:t>5/5/2015</a:t>
             </a:fld>
             <a:endParaRPr lang="en-US"/>
           </a:p>
@@ -2447,7 +2536,7 @@
           <a:p>
             <a:fld id="{25F75D5F-615C-49DE-B9F3-D8BF94771A47}" type="datetimeFigureOut">
               <a:rPr lang="en-US" smtClean="0"/>
-              <a:t>5/4/2015</a:t>
+              <a:t>5/5/2015</a:t>
             </a:fld>
             <a:endParaRPr lang="en-US"/>
           </a:p>
@@ -2542,7 +2631,7 @@
           <a:p>
             <a:fld id="{25F75D5F-615C-49DE-B9F3-D8BF94771A47}" type="datetimeFigureOut">
               <a:rPr lang="en-US" smtClean="0"/>
-              <a:t>5/4/2015</a:t>
+              <a:t>5/5/2015</a:t>
             </a:fld>
             <a:endParaRPr lang="en-US"/>
           </a:p>
@@ -2819,7 +2908,7 @@
           <a:p>
             <a:fld id="{25F75D5F-615C-49DE-B9F3-D8BF94771A47}" type="datetimeFigureOut">
               <a:rPr lang="en-US" smtClean="0"/>
-              <a:t>5/4/2015</a:t>
+              <a:t>5/5/2015</a:t>
             </a:fld>
             <a:endParaRPr lang="en-US"/>
           </a:p>
@@ -3072,7 +3161,7 @@
           <a:p>
             <a:fld id="{25F75D5F-615C-49DE-B9F3-D8BF94771A47}" type="datetimeFigureOut">
               <a:rPr lang="en-US" smtClean="0"/>
-              <a:t>5/4/2015</a:t>
+              <a:t>5/5/2015</a:t>
             </a:fld>
             <a:endParaRPr lang="en-US"/>
           </a:p>
@@ -3285,7 +3374,7 @@
           <a:p>
             <a:fld id="{25F75D5F-615C-49DE-B9F3-D8BF94771A47}" type="datetimeFigureOut">
               <a:rPr lang="en-US" smtClean="0"/>
-              <a:t>5/4/2015</a:t>
+              <a:t>5/5/2015</a:t>
             </a:fld>
             <a:endParaRPr lang="en-US"/>
           </a:p>
@@ -3856,7 +3945,7 @@
       </p:sp>
       <p:pic>
         <p:nvPicPr>
-          <p:cNvPr id="7171" name="Picture 3"/>
+          <p:cNvPr id="9218" name="Picture 2"/>
           <p:cNvPicPr>
             <a:picLocks noChangeAspect="1" noChangeArrowheads="1"/>
           </p:cNvPicPr>
@@ -3877,7 +3966,308 @@
         </p:blipFill>
         <p:spPr bwMode="auto">
           <a:xfrm>
-            <a:off x="712788" y="1371600"/>
+            <a:off x="331098" y="1981200"/>
+            <a:ext cx="4457700" cy="3390900"/>
+          </a:xfrm>
+          <a:prstGeom prst="rect">
+            <a:avLst/>
+          </a:prstGeom>
+          <a:noFill/>
+          <a:ln>
+            <a:noFill/>
+          </a:ln>
+          <a:effectLst/>
+          <a:extLst>
+            <a:ext uri="{909E8E84-426E-40DD-AFC4-6F175D3DCCD1}">
+              <a14:hiddenFill xmlns:a14="http://schemas.microsoft.com/office/drawing/2010/main">
+                <a:solidFill>
+                  <a:schemeClr val="accent1"/>
+                </a:solidFill>
+              </a14:hiddenFill>
+            </a:ext>
+            <a:ext uri="{91240B29-F687-4F45-9708-019B960494DF}">
+              <a14:hiddenLine xmlns:a14="http://schemas.microsoft.com/office/drawing/2010/main" w="9525">
+                <a:solidFill>
+                  <a:schemeClr val="tx1"/>
+                </a:solidFill>
+                <a:miter lim="800000"/>
+                <a:headEnd/>
+                <a:tailEnd/>
+              </a14:hiddenLine>
+            </a:ext>
+            <a:ext uri="{AF507438-7753-43E0-B8FC-AC1667EBCBE1}">
+              <a14:hiddenEffects xmlns:a14="http://schemas.microsoft.com/office/drawing/2010/main">
+                <a:effectLst>
+                  <a:outerShdw dist="35921" dir="2700000" algn="ctr" rotWithShape="0">
+                    <a:schemeClr val="bg2"/>
+                  </a:outerShdw>
+                </a:effectLst>
+              </a14:hiddenEffects>
+            </a:ext>
+          </a:extLst>
+        </p:spPr>
+      </p:pic>
+      <p:sp>
+        <p:nvSpPr>
+          <p:cNvPr id="3" name="TextBox 2"/>
+          <p:cNvSpPr txBox="1"/>
+          <p:nvPr/>
+        </p:nvSpPr>
+        <p:spPr>
+          <a:xfrm>
+            <a:off x="1011286" y="1627115"/>
+            <a:ext cx="3097323" cy="369332"/>
+          </a:xfrm>
+          <a:prstGeom prst="rect">
+            <a:avLst/>
+          </a:prstGeom>
+          <a:noFill/>
+        </p:spPr>
+        <p:txBody>
+          <a:bodyPr wrap="none" rtlCol="0">
+            <a:spAutoFit/>
+          </a:bodyPr>
+          <a:lstStyle/>
+          <a:p>
+            <a:r>
+              <a:rPr lang="en-US" dirty="0" smtClean="0">
+                <a:latin typeface="Adobe Fan Heiti Std B" pitchFamily="34" charset="-128"/>
+                <a:ea typeface="Adobe Fan Heiti Std B" pitchFamily="34" charset="-128"/>
+              </a:rPr>
+              <a:t>Snapshot adversarial model</a:t>
+            </a:r>
+            <a:endParaRPr lang="en-US" dirty="0">
+              <a:latin typeface="Adobe Fan Heiti Std B" pitchFamily="34" charset="-128"/>
+              <a:ea typeface="Adobe Fan Heiti Std B" pitchFamily="34" charset="-128"/>
+            </a:endParaRPr>
+          </a:p>
+        </p:txBody>
+      </p:sp>
+      <p:sp>
+        <p:nvSpPr>
+          <p:cNvPr id="4" name="TextBox 3"/>
+          <p:cNvSpPr txBox="1"/>
+          <p:nvPr/>
+        </p:nvSpPr>
+        <p:spPr>
+          <a:xfrm>
+            <a:off x="4708967" y="2383988"/>
+            <a:ext cx="3829510" cy="2585323"/>
+          </a:xfrm>
+          <a:prstGeom prst="rect">
+            <a:avLst/>
+          </a:prstGeom>
+          <a:noFill/>
+        </p:spPr>
+        <p:txBody>
+          <a:bodyPr wrap="none" rtlCol="0">
+            <a:spAutoFit/>
+          </a:bodyPr>
+          <a:lstStyle/>
+          <a:p>
+            <a:r>
+              <a:rPr lang="en-US" b="1" dirty="0" smtClean="0">
+                <a:latin typeface="Calibri Light" panose="020F0302020204030204" pitchFamily="34" charset="0"/>
+              </a:rPr>
+              <a:t>Shah and Zaman</a:t>
+            </a:r>
+            <a:r>
+              <a:rPr lang="en-US" dirty="0" smtClean="0">
+                <a:latin typeface="Calibri Light" panose="020F0302020204030204" pitchFamily="34" charset="0"/>
+              </a:rPr>
+              <a:t>, </a:t>
+            </a:r>
+            <a:r>
+              <a:rPr lang="en-US" dirty="0" smtClean="0">
+                <a:latin typeface="Calibri Light" panose="020F0302020204030204" pitchFamily="34" charset="0"/>
+              </a:rPr>
+              <a:t>2011</a:t>
+            </a:r>
+          </a:p>
+          <a:p>
+            <a:endParaRPr lang="en-US" dirty="0" smtClean="0">
+              <a:latin typeface="Calibri Light" panose="020F0302020204030204" pitchFamily="34" charset="0"/>
+            </a:endParaRPr>
+          </a:p>
+          <a:p>
+            <a:r>
+              <a:rPr lang="en-US" b="1" dirty="0" err="1" smtClean="0">
+                <a:latin typeface="Calibri Light" panose="020F0302020204030204" pitchFamily="34" charset="0"/>
+              </a:rPr>
+              <a:t>Karamchandani</a:t>
+            </a:r>
+            <a:r>
+              <a:rPr lang="en-US" b="1" dirty="0" smtClean="0">
+                <a:latin typeface="Calibri Light" panose="020F0302020204030204" pitchFamily="34" charset="0"/>
+              </a:rPr>
+              <a:t> and </a:t>
+            </a:r>
+            <a:r>
+              <a:rPr lang="en-US" b="1" dirty="0" err="1" smtClean="0">
+                <a:latin typeface="Calibri Light" panose="020F0302020204030204" pitchFamily="34" charset="0"/>
+              </a:rPr>
+              <a:t>Franceschetti</a:t>
+            </a:r>
+            <a:r>
+              <a:rPr lang="en-US" dirty="0" smtClean="0">
+                <a:latin typeface="Calibri Light" panose="020F0302020204030204" pitchFamily="34" charset="0"/>
+              </a:rPr>
+              <a:t>, 2013</a:t>
+            </a:r>
+          </a:p>
+          <a:p>
+            <a:endParaRPr lang="en-US" b="1" dirty="0" smtClean="0">
+              <a:latin typeface="Calibri Light" panose="020F0302020204030204" pitchFamily="34" charset="0"/>
+            </a:endParaRPr>
+          </a:p>
+          <a:p>
+            <a:r>
+              <a:rPr lang="en-US" b="1" dirty="0" smtClean="0">
+                <a:latin typeface="Calibri Light" panose="020F0302020204030204" pitchFamily="34" charset="0"/>
+              </a:rPr>
+              <a:t>Dong </a:t>
+            </a:r>
+            <a:r>
+              <a:rPr lang="en-US" b="1" dirty="0" smtClean="0">
+                <a:latin typeface="Calibri Light" panose="020F0302020204030204" pitchFamily="34" charset="0"/>
+              </a:rPr>
+              <a:t>et al</a:t>
+            </a:r>
+            <a:r>
+              <a:rPr lang="en-US" dirty="0" smtClean="0">
+                <a:latin typeface="Calibri Light" panose="020F0302020204030204" pitchFamily="34" charset="0"/>
+              </a:rPr>
+              <a:t>., 2014</a:t>
+            </a:r>
+          </a:p>
+          <a:p>
+            <a:endParaRPr lang="en-US" b="1" dirty="0" smtClean="0">
+              <a:latin typeface="Calibri Light" panose="020F0302020204030204" pitchFamily="34" charset="0"/>
+            </a:endParaRPr>
+          </a:p>
+          <a:p>
+            <a:r>
+              <a:rPr lang="en-US" b="1" dirty="0" err="1" smtClean="0">
+                <a:latin typeface="Calibri Light" panose="020F0302020204030204" pitchFamily="34" charset="0"/>
+              </a:rPr>
+              <a:t>Lokhov</a:t>
+            </a:r>
+            <a:r>
+              <a:rPr lang="en-US" b="1" dirty="0" smtClean="0">
+                <a:latin typeface="Calibri Light" panose="020F0302020204030204" pitchFamily="34" charset="0"/>
+              </a:rPr>
+              <a:t> </a:t>
+            </a:r>
+            <a:r>
+              <a:rPr lang="en-US" b="1" dirty="0" smtClean="0">
+                <a:latin typeface="Calibri Light" panose="020F0302020204030204" pitchFamily="34" charset="0"/>
+              </a:rPr>
+              <a:t>et al</a:t>
+            </a:r>
+            <a:r>
+              <a:rPr lang="en-US" dirty="0" smtClean="0">
+                <a:latin typeface="Calibri Light" panose="020F0302020204030204" pitchFamily="34" charset="0"/>
+              </a:rPr>
+              <a:t>., 2014</a:t>
+            </a:r>
+          </a:p>
+          <a:p>
+            <a:endParaRPr lang="en-US" b="1" dirty="0" smtClean="0">
+              <a:latin typeface="Calibri Light" panose="020F0302020204030204" pitchFamily="34" charset="0"/>
+            </a:endParaRPr>
+          </a:p>
+          <a:p>
+            <a:r>
+              <a:rPr lang="en-US" b="1" dirty="0" err="1" smtClean="0">
+                <a:latin typeface="Calibri Light" panose="020F0302020204030204" pitchFamily="34" charset="0"/>
+              </a:rPr>
+              <a:t>Altarelli</a:t>
+            </a:r>
+            <a:r>
+              <a:rPr lang="en-US" b="1" dirty="0" smtClean="0">
+                <a:latin typeface="Calibri Light" panose="020F0302020204030204" pitchFamily="34" charset="0"/>
+              </a:rPr>
+              <a:t> </a:t>
+            </a:r>
+            <a:r>
+              <a:rPr lang="en-US" b="1" dirty="0" smtClean="0">
+                <a:latin typeface="Calibri Light" panose="020F0302020204030204" pitchFamily="34" charset="0"/>
+              </a:rPr>
+              <a:t>et al</a:t>
+            </a:r>
+            <a:r>
+              <a:rPr lang="en-US" dirty="0" smtClean="0">
+                <a:latin typeface="Calibri Light" panose="020F0302020204030204" pitchFamily="34" charset="0"/>
+              </a:rPr>
+              <a:t>., 2014</a:t>
+            </a:r>
+            <a:endParaRPr lang="en-US" dirty="0">
+              <a:latin typeface="Calibri Light" panose="020F0302020204030204" pitchFamily="34" charset="0"/>
+            </a:endParaRPr>
+          </a:p>
+        </p:txBody>
+      </p:sp>
+    </p:spTree>
+    <p:extLst>
+      <p:ext uri="{BB962C8B-B14F-4D97-AF65-F5344CB8AC3E}">
+        <p14:creationId xmlns:p14="http://schemas.microsoft.com/office/powerpoint/2010/main" val="1032818089"/>
+      </p:ext>
+    </p:extLst>
+  </p:cSld>
+  <p:clrMapOvr>
+    <a:masterClrMapping/>
+  </p:clrMapOvr>
+  <p:timing>
+    <p:tnLst>
+      <p:par>
+        <p:cTn id="1" dur="indefinite" restart="never" nodeType="tmRoot"/>
+      </p:par>
+    </p:tnLst>
+  </p:timing>
+</p:sld>
+</file>
+
+<file path=ppt/slides/slide12.xml><?xml version="1.0" encoding="utf-8"?>
+<p:sld xmlns:a="http://schemas.openxmlformats.org/drawingml/2006/main" xmlns:r="http://schemas.openxmlformats.org/officeDocument/2006/relationships" xmlns:p="http://schemas.openxmlformats.org/presentationml/2006/main">
+  <p:cSld>
+    <p:spTree>
+      <p:nvGrpSpPr>
+        <p:cNvPr id="1" name=""/>
+        <p:cNvGrpSpPr/>
+        <p:nvPr/>
+      </p:nvGrpSpPr>
+      <p:grpSpPr>
+        <a:xfrm>
+          <a:off x="0" y="0"/>
+          <a:ext cx="0" cy="0"/>
+          <a:chOff x="0" y="0"/>
+          <a:chExt cx="0" cy="0"/>
+        </a:xfrm>
+      </p:grpSpPr>
+      <p:pic>
+        <p:nvPicPr>
+          <p:cNvPr id="4" name="Picture 3"/>
+          <p:cNvPicPr>
+            <a:picLocks noChangeAspect="1" noChangeArrowheads="1"/>
+          </p:cNvPicPr>
+          <p:nvPr/>
+        </p:nvPicPr>
+        <p:blipFill>
+          <a:blip r:embed="rId2">
+            <a:extLst>
+              <a:ext uri="{28A0092B-C50C-407E-A947-70E740481C1C}">
+                <a14:useLocalDpi xmlns:a14="http://schemas.microsoft.com/office/drawing/2010/main" val="0"/>
+              </a:ext>
+            </a:extLst>
+          </a:blip>
+          <a:srcRect/>
+          <a:stretch>
+            <a:fillRect/>
+          </a:stretch>
+        </p:blipFill>
+        <p:spPr bwMode="auto">
+          <a:xfrm>
+            <a:off x="712787" y="838200"/>
             <a:ext cx="7716837" cy="1562100"/>
           </a:xfrm>
           <a:prstGeom prst="rect">
@@ -3920,7 +4310,7 @@
       </p:pic>
       <p:pic>
         <p:nvPicPr>
-          <p:cNvPr id="7172" name="Picture 4"/>
+          <p:cNvPr id="5" name="Picture 4"/>
           <p:cNvPicPr>
             <a:picLocks noChangeAspect="1" noChangeArrowheads="1"/>
           </p:cNvPicPr>
@@ -3941,7 +4331,7 @@
         </p:blipFill>
         <p:spPr bwMode="auto">
           <a:xfrm>
-            <a:off x="1413509" y="3048000"/>
+            <a:off x="990600" y="2743200"/>
             <a:ext cx="5716587" cy="3571875"/>
           </a:xfrm>
           <a:prstGeom prst="rect">
@@ -3985,7 +4375,7 @@
     </p:spTree>
     <p:extLst>
       <p:ext uri="{BB962C8B-B14F-4D97-AF65-F5344CB8AC3E}">
-        <p14:creationId xmlns:p14="http://schemas.microsoft.com/office/powerpoint/2010/main" val="1032818089"/>
+        <p14:creationId xmlns:p14="http://schemas.microsoft.com/office/powerpoint/2010/main" val="2641371123"/>
       </p:ext>
     </p:extLst>
   </p:cSld>
@@ -4002,7 +4392,7 @@
 </p:sld>
 </file>
 
-<file path=ppt/slides/slide12.xml><?xml version="1.0" encoding="utf-8"?>
+<file path=ppt/slides/slide13.xml><?xml version="1.0" encoding="utf-8"?>
 <p:sld xmlns:a="http://schemas.openxmlformats.org/drawingml/2006/main" xmlns:r="http://schemas.openxmlformats.org/officeDocument/2006/relationships" xmlns:p="http://schemas.openxmlformats.org/presentationml/2006/main">
   <p:cSld>
     <p:spTree>
@@ -4019,8 +4409,8 @@
           <a:chExt cx="0" cy="0"/>
         </a:xfrm>
       </p:grpSpPr>
-      <mc:AlternateContent xmlns:mc="http://schemas.openxmlformats.org/markup-compatibility/2006">
-        <mc:Choice xmlns:a14="http://schemas.microsoft.com/office/drawing/2010/main" Requires="a14">
+      <mc:AlternateContent xmlns:mc="http://schemas.openxmlformats.org/markup-compatibility/2006" xmlns:a14="http://schemas.microsoft.com/office/drawing/2010/main">
+        <mc:Choice Requires="a14">
           <p:sp>
             <p:nvSpPr>
               <p:cNvPr id="4" name="TextBox 3"/>
@@ -4043,6 +4433,7 @@
               </a:bodyPr>
               <a:lstStyle/>
               <a:p>
+                <a:pPr/>
                 <a14:m>
                   <m:oMathPara xmlns:m="http://schemas.openxmlformats.org/officeDocument/2006/math">
                     <m:oMathParaPr>
@@ -4143,7 +4534,7 @@
             </p:txBody>
           </p:sp>
         </mc:Choice>
-        <mc:Fallback>
+        <mc:Fallback xmlns="">
           <p:sp>
             <p:nvSpPr>
               <p:cNvPr id="4" name="TextBox 3"/>
@@ -4246,8 +4637,8 @@
           </a:extLst>
         </p:spPr>
       </p:pic>
-      <mc:AlternateContent xmlns:mc="http://schemas.openxmlformats.org/markup-compatibility/2006">
-        <mc:Choice xmlns:a14="http://schemas.microsoft.com/office/drawing/2010/main" Requires="a14">
+      <mc:AlternateContent xmlns:mc="http://schemas.openxmlformats.org/markup-compatibility/2006" xmlns:a14="http://schemas.microsoft.com/office/drawing/2010/main">
+        <mc:Choice Requires="a14">
           <p:sp>
             <p:nvSpPr>
               <p:cNvPr id="5" name="TextBox 4"/>
@@ -4256,7 +4647,7 @@
             </p:nvSpPr>
             <p:spPr>
               <a:xfrm>
-                <a:off x="4405312" y="512802"/>
+                <a:off x="6153150" y="457200"/>
                 <a:ext cx="2514471" cy="923330"/>
               </a:xfrm>
               <a:prstGeom prst="rect">
@@ -4360,11 +4751,7 @@
                 </a14:m>
                 <a:r>
                   <a:rPr lang="en-US" dirty="0" smtClean="0"/>
-                  <a:t> </a:t>
-                </a:r>
-                <a:r>
-                  <a:rPr lang="en-US" dirty="0" smtClean="0"/>
-                  <a:t>k</a:t>
+                  <a:t> k</a:t>
                 </a:r>
                 <a:r>
                   <a:rPr lang="en-US" baseline="30000" dirty="0" smtClean="0">
@@ -4417,11 +4804,7 @@
                 </a14:m>
                 <a:r>
                   <a:rPr lang="en-US" dirty="0" smtClean="0"/>
-                  <a:t> </a:t>
-                </a:r>
-                <a:r>
-                  <a:rPr lang="en-US" dirty="0" smtClean="0"/>
-                  <a:t>k</a:t>
+                  <a:t> k</a:t>
                 </a:r>
                 <a:r>
                   <a:rPr lang="en-US" baseline="30000" dirty="0" smtClean="0">
@@ -4439,7 +4822,7 @@
             </p:txBody>
           </p:sp>
         </mc:Choice>
-        <mc:Fallback>
+        <mc:Fallback xmlns="">
           <p:sp>
             <p:nvSpPr>
               <p:cNvPr id="5" name="TextBox 4"/>
@@ -4450,7 +4833,7 @@
             </p:nvSpPr>
             <p:spPr>
               <a:xfrm>
-                <a:off x="4405312" y="512802"/>
+                <a:off x="6153150" y="457200"/>
                 <a:ext cx="2514471" cy="923330"/>
               </a:xfrm>
               <a:prstGeom prst="rect">
@@ -4459,7 +4842,7 @@
               <a:blipFill rotWithShape="1">
                 <a:blip r:embed="rId4"/>
                 <a:stretch>
-                  <a:fillRect t="-3289" b="-9211"/>
+                  <a:fillRect t="-3311" b="-9934"/>
                 </a:stretch>
               </a:blipFill>
             </p:spPr>
@@ -4501,7 +4884,7 @@
         </p:blipFill>
         <p:spPr bwMode="auto">
           <a:xfrm>
-            <a:off x="362310" y="2895600"/>
+            <a:off x="387388" y="2512696"/>
             <a:ext cx="4610100" cy="1047750"/>
           </a:xfrm>
           <a:prstGeom prst="rect">
@@ -4550,7 +4933,7 @@
         </p:nvSpPr>
         <p:spPr>
           <a:xfrm>
-            <a:off x="1905000" y="4114800"/>
+            <a:off x="1930078" y="3731896"/>
             <a:ext cx="1042978" cy="646331"/>
           </a:xfrm>
           <a:prstGeom prst="rect">
@@ -4594,7 +4977,7 @@
         </p:nvSpPr>
         <p:spPr>
           <a:xfrm>
-            <a:off x="3397402" y="4192904"/>
+            <a:off x="3422480" y="3810000"/>
             <a:ext cx="1563377" cy="646331"/>
           </a:xfrm>
           <a:prstGeom prst="rect">
@@ -4638,7 +5021,7 @@
         </p:nvSpPr>
         <p:spPr>
           <a:xfrm>
-            <a:off x="2008257" y="1981200"/>
+            <a:off x="2033335" y="1598296"/>
             <a:ext cx="1991827" cy="646331"/>
           </a:xfrm>
           <a:prstGeom prst="rect">
@@ -4684,7 +5067,7 @@
         </p:nvCxnSpPr>
         <p:spPr>
           <a:xfrm flipV="1">
-            <a:off x="2426489" y="3505200"/>
+            <a:off x="2451567" y="3122296"/>
             <a:ext cx="120435" cy="609600"/>
           </a:xfrm>
           <a:prstGeom prst="straightConnector1">
@@ -4722,7 +5105,7 @@
         </p:nvCxnSpPr>
         <p:spPr>
           <a:xfrm flipH="1" flipV="1">
-            <a:off x="4179090" y="3733800"/>
+            <a:off x="4204168" y="3350896"/>
             <a:ext cx="1" cy="459104"/>
           </a:xfrm>
           <a:prstGeom prst="straightConnector1">
@@ -4760,7 +5143,7 @@
         </p:nvCxnSpPr>
         <p:spPr>
           <a:xfrm flipH="1">
-            <a:off x="3004170" y="2627531"/>
+            <a:off x="3029248" y="2244627"/>
             <a:ext cx="1" cy="390406"/>
           </a:xfrm>
           <a:prstGeom prst="straightConnector1">
@@ -5167,7 +5550,1024 @@
 </p:sld>
 </file>
 
-<file path=ppt/slides/slide13.xml><?xml version="1.0" encoding="utf-8"?>
+<file path=ppt/slides/slide14.xml><?xml version="1.0" encoding="utf-8"?>
+<p:sld xmlns:a="http://schemas.openxmlformats.org/drawingml/2006/main" xmlns:r="http://schemas.openxmlformats.org/officeDocument/2006/relationships" xmlns:p="http://schemas.openxmlformats.org/presentationml/2006/main">
+  <p:cSld>
+    <p:spTree>
+      <p:nvGrpSpPr>
+        <p:cNvPr id="1" name=""/>
+        <p:cNvGrpSpPr/>
+        <p:nvPr/>
+      </p:nvGrpSpPr>
+      <p:grpSpPr>
+        <a:xfrm>
+          <a:off x="0" y="0"/>
+          <a:ext cx="0" cy="0"/>
+          <a:chOff x="0" y="0"/>
+          <a:chExt cx="0" cy="0"/>
+        </a:xfrm>
+      </p:grpSpPr>
+      <p:pic>
+        <p:nvPicPr>
+          <p:cNvPr id="9218" name="Picture 2"/>
+          <p:cNvPicPr>
+            <a:picLocks noChangeAspect="1" noChangeArrowheads="1"/>
+          </p:cNvPicPr>
+          <p:nvPr/>
+        </p:nvPicPr>
+        <p:blipFill>
+          <a:blip r:embed="rId2">
+            <a:extLst>
+              <a:ext uri="{28A0092B-C50C-407E-A947-70E740481C1C}">
+                <a14:useLocalDpi xmlns:a14="http://schemas.microsoft.com/office/drawing/2010/main" val="0"/>
+              </a:ext>
+            </a:extLst>
+          </a:blip>
+          <a:srcRect/>
+          <a:stretch>
+            <a:fillRect/>
+          </a:stretch>
+        </p:blipFill>
+        <p:spPr bwMode="auto">
+          <a:xfrm>
+            <a:off x="1698625" y="1203325"/>
+            <a:ext cx="5745163" cy="4457700"/>
+          </a:xfrm>
+          <a:prstGeom prst="rect">
+            <a:avLst/>
+          </a:prstGeom>
+          <a:noFill/>
+          <a:ln>
+            <a:noFill/>
+          </a:ln>
+          <a:effectLst/>
+          <a:extLst>
+            <a:ext uri="{909E8E84-426E-40DD-AFC4-6F175D3DCCD1}">
+              <a14:hiddenFill xmlns:a14="http://schemas.microsoft.com/office/drawing/2010/main">
+                <a:solidFill>
+                  <a:schemeClr val="accent1"/>
+                </a:solidFill>
+              </a14:hiddenFill>
+            </a:ext>
+            <a:ext uri="{91240B29-F687-4F45-9708-019B960494DF}">
+              <a14:hiddenLine xmlns:a14="http://schemas.microsoft.com/office/drawing/2010/main" w="9525">
+                <a:solidFill>
+                  <a:schemeClr val="tx1"/>
+                </a:solidFill>
+                <a:miter lim="800000"/>
+                <a:headEnd/>
+                <a:tailEnd/>
+              </a14:hiddenLine>
+            </a:ext>
+            <a:ext uri="{AF507438-7753-43E0-B8FC-AC1667EBCBE1}">
+              <a14:hiddenEffects xmlns:a14="http://schemas.microsoft.com/office/drawing/2010/main">
+                <a:effectLst>
+                  <a:outerShdw dist="35921" dir="2700000" algn="ctr" rotWithShape="0">
+                    <a:schemeClr val="bg2"/>
+                  </a:outerShdw>
+                </a:effectLst>
+              </a14:hiddenEffects>
+            </a:ext>
+          </a:extLst>
+        </p:spPr>
+      </p:pic>
+      <mc:AlternateContent xmlns:mc="http://schemas.openxmlformats.org/markup-compatibility/2006">
+        <mc:Choice xmlns:a14="http://schemas.microsoft.com/office/drawing/2010/main" Requires="a14">
+          <p:sp>
+            <p:nvSpPr>
+              <p:cNvPr id="2" name="TextBox 1"/>
+              <p:cNvSpPr txBox="1"/>
+              <p:nvPr/>
+            </p:nvSpPr>
+            <p:spPr>
+              <a:xfrm>
+                <a:off x="7086600" y="4800600"/>
+                <a:ext cx="1167051" cy="369332"/>
+              </a:xfrm>
+              <a:prstGeom prst="rect">
+                <a:avLst/>
+              </a:prstGeom>
+              <a:noFill/>
+            </p:spPr>
+            <p:txBody>
+              <a:bodyPr wrap="none" rtlCol="0">
+                <a:spAutoFit/>
+              </a:bodyPr>
+              <a:lstStyle/>
+              <a:p>
+                <a14:m>
+                  <m:oMathPara xmlns:m="http://schemas.openxmlformats.org/officeDocument/2006/math">
+                    <m:oMathParaPr>
+                      <m:jc m:val="centerGroup"/>
+                    </m:oMathParaPr>
+                    <m:oMath xmlns:m="http://schemas.openxmlformats.org/officeDocument/2006/math">
+                      <m:sSub>
+                        <m:sSubPr>
+                          <m:ctrlPr>
+                            <a:rPr lang="en-US" b="0" i="1" smtClean="0">
+                              <a:latin typeface="Cambria Math"/>
+                            </a:rPr>
+                          </m:ctrlPr>
+                        </m:sSubPr>
+                        <m:e>
+                          <m:r>
+                            <a:rPr lang="en-US" b="0" i="1" smtClean="0">
+                              <a:latin typeface="Cambria Math"/>
+                            </a:rPr>
+                            <m:t>𝑡</m:t>
+                          </m:r>
+                        </m:e>
+                        <m:sub>
+                          <m:r>
+                            <a:rPr lang="en-US" b="0" i="1" smtClean="0">
+                              <a:latin typeface="Cambria Math"/>
+                            </a:rPr>
+                            <m:t>2</m:t>
+                          </m:r>
+                        </m:sub>
+                      </m:sSub>
+                      <m:r>
+                        <a:rPr lang="en-US" b="0" i="1" smtClean="0">
+                          <a:latin typeface="Cambria Math"/>
+                        </a:rPr>
+                        <m:t>=2.17</m:t>
+                      </m:r>
+                    </m:oMath>
+                  </m:oMathPara>
+                </a14:m>
+                <a:endParaRPr lang="en-US" dirty="0"/>
+              </a:p>
+            </p:txBody>
+          </p:sp>
+        </mc:Choice>
+        <mc:Fallback>
+          <p:sp>
+            <p:nvSpPr>
+              <p:cNvPr id="2" name="TextBox 1"/>
+              <p:cNvSpPr txBox="1">
+                <a:spLocks noRot="1" noChangeAspect="1" noMove="1" noResize="1" noEditPoints="1" noAdjustHandles="1" noChangeArrowheads="1" noChangeShapeType="1" noTextEdit="1"/>
+              </p:cNvSpPr>
+              <p:nvPr/>
+            </p:nvSpPr>
+            <p:spPr>
+              <a:xfrm>
+                <a:off x="7086600" y="4800600"/>
+                <a:ext cx="1167051" cy="369332"/>
+              </a:xfrm>
+              <a:prstGeom prst="rect">
+                <a:avLst/>
+              </a:prstGeom>
+              <a:blipFill rotWithShape="1">
+                <a:blip r:embed="rId3"/>
+                <a:stretch>
+                  <a:fillRect/>
+                </a:stretch>
+              </a:blipFill>
+            </p:spPr>
+            <p:txBody>
+              <a:bodyPr/>
+              <a:lstStyle/>
+              <a:p>
+                <a:r>
+                  <a:rPr lang="en-US">
+                    <a:noFill/>
+                  </a:rPr>
+                  <a:t> </a:t>
+                </a:r>
+              </a:p>
+            </p:txBody>
+          </p:sp>
+        </mc:Fallback>
+      </mc:AlternateContent>
+      <mc:AlternateContent xmlns:mc="http://schemas.openxmlformats.org/markup-compatibility/2006">
+        <mc:Choice xmlns:a14="http://schemas.microsoft.com/office/drawing/2010/main" Requires="a14">
+          <p:sp>
+            <p:nvSpPr>
+              <p:cNvPr id="4" name="TextBox 3"/>
+              <p:cNvSpPr txBox="1"/>
+              <p:nvPr/>
+            </p:nvSpPr>
+            <p:spPr>
+              <a:xfrm>
+                <a:off x="3987680" y="4431268"/>
+                <a:ext cx="1167051" cy="369332"/>
+              </a:xfrm>
+              <a:prstGeom prst="rect">
+                <a:avLst/>
+              </a:prstGeom>
+              <a:noFill/>
+            </p:spPr>
+            <p:txBody>
+              <a:bodyPr wrap="none" rtlCol="0">
+                <a:spAutoFit/>
+              </a:bodyPr>
+              <a:lstStyle/>
+              <a:p>
+                <a14:m>
+                  <m:oMathPara xmlns:m="http://schemas.openxmlformats.org/officeDocument/2006/math">
+                    <m:oMathParaPr>
+                      <m:jc m:val="centerGroup"/>
+                    </m:oMathParaPr>
+                    <m:oMath xmlns:m="http://schemas.openxmlformats.org/officeDocument/2006/math">
+                      <m:sSub>
+                        <m:sSubPr>
+                          <m:ctrlPr>
+                            <a:rPr lang="en-US" b="0" i="1" smtClean="0">
+                              <a:latin typeface="Cambria Math"/>
+                            </a:rPr>
+                          </m:ctrlPr>
+                        </m:sSubPr>
+                        <m:e>
+                          <m:r>
+                            <a:rPr lang="en-US" b="0" i="1" smtClean="0">
+                              <a:latin typeface="Cambria Math"/>
+                            </a:rPr>
+                            <m:t>𝑡</m:t>
+                          </m:r>
+                        </m:e>
+                        <m:sub>
+                          <m:r>
+                            <a:rPr lang="en-US" b="0" i="1" smtClean="0">
+                              <a:latin typeface="Cambria Math"/>
+                            </a:rPr>
+                            <m:t>2</m:t>
+                          </m:r>
+                        </m:sub>
+                      </m:sSub>
+                      <m:r>
+                        <a:rPr lang="en-US" b="0" i="1" smtClean="0">
+                          <a:latin typeface="Cambria Math"/>
+                        </a:rPr>
+                        <m:t>=2.33</m:t>
+                      </m:r>
+                    </m:oMath>
+                  </m:oMathPara>
+                </a14:m>
+                <a:endParaRPr lang="en-US" dirty="0"/>
+              </a:p>
+            </p:txBody>
+          </p:sp>
+        </mc:Choice>
+        <mc:Fallback>
+          <p:sp>
+            <p:nvSpPr>
+              <p:cNvPr id="4" name="TextBox 3"/>
+              <p:cNvSpPr txBox="1">
+                <a:spLocks noRot="1" noChangeAspect="1" noMove="1" noResize="1" noEditPoints="1" noAdjustHandles="1" noChangeArrowheads="1" noChangeShapeType="1" noTextEdit="1"/>
+              </p:cNvSpPr>
+              <p:nvPr/>
+            </p:nvSpPr>
+            <p:spPr>
+              <a:xfrm>
+                <a:off x="3987680" y="4431268"/>
+                <a:ext cx="1167051" cy="369332"/>
+              </a:xfrm>
+              <a:prstGeom prst="rect">
+                <a:avLst/>
+              </a:prstGeom>
+              <a:blipFill rotWithShape="1">
+                <a:blip r:embed="rId4"/>
+                <a:stretch>
+                  <a:fillRect/>
+                </a:stretch>
+              </a:blipFill>
+            </p:spPr>
+            <p:txBody>
+              <a:bodyPr/>
+              <a:lstStyle/>
+              <a:p>
+                <a:r>
+                  <a:rPr lang="en-US">
+                    <a:noFill/>
+                  </a:rPr>
+                  <a:t> </a:t>
+                </a:r>
+              </a:p>
+            </p:txBody>
+          </p:sp>
+        </mc:Fallback>
+      </mc:AlternateContent>
+      <p:sp>
+        <p:nvSpPr>
+          <p:cNvPr id="3" name="Oval 2"/>
+          <p:cNvSpPr/>
+          <p:nvPr/>
+        </p:nvSpPr>
+        <p:spPr>
+          <a:xfrm>
+            <a:off x="5410200" y="3048000"/>
+            <a:ext cx="381000" cy="384175"/>
+          </a:xfrm>
+          <a:prstGeom prst="ellipse">
+            <a:avLst/>
+          </a:prstGeom>
+          <a:noFill/>
+          <a:ln w="57150">
+            <a:solidFill>
+              <a:srgbClr val="92D050"/>
+            </a:solidFill>
+          </a:ln>
+        </p:spPr>
+        <p:style>
+          <a:lnRef idx="2">
+            <a:schemeClr val="accent1">
+              <a:shade val="50000"/>
+            </a:schemeClr>
+          </a:lnRef>
+          <a:fillRef idx="1">
+            <a:schemeClr val="accent1"/>
+          </a:fillRef>
+          <a:effectRef idx="0">
+            <a:schemeClr val="accent1"/>
+          </a:effectRef>
+          <a:fontRef idx="minor">
+            <a:schemeClr val="lt1"/>
+          </a:fontRef>
+        </p:style>
+        <p:txBody>
+          <a:bodyPr rtlCol="0" anchor="ctr"/>
+          <a:lstStyle/>
+          <a:p>
+            <a:pPr algn="ctr"/>
+            <a:endParaRPr lang="en-US"/>
+          </a:p>
+        </p:txBody>
+      </p:sp>
+      <p:sp>
+        <p:nvSpPr>
+          <p:cNvPr id="5" name="TextBox 4"/>
+          <p:cNvSpPr txBox="1"/>
+          <p:nvPr/>
+        </p:nvSpPr>
+        <p:spPr>
+          <a:xfrm>
+            <a:off x="6172200" y="2514600"/>
+            <a:ext cx="1276247" cy="369332"/>
+          </a:xfrm>
+          <a:prstGeom prst="rect">
+            <a:avLst/>
+          </a:prstGeom>
+          <a:noFill/>
+        </p:spPr>
+        <p:txBody>
+          <a:bodyPr wrap="none" rtlCol="0">
+            <a:spAutoFit/>
+          </a:bodyPr>
+          <a:lstStyle/>
+          <a:p>
+            <a:r>
+              <a:rPr lang="en-US" dirty="0" smtClean="0">
+                <a:latin typeface="Calibri Light" panose="020F0302020204030204" pitchFamily="34" charset="0"/>
+              </a:rPr>
+              <a:t>True source</a:t>
+            </a:r>
+            <a:endParaRPr lang="en-US" dirty="0">
+              <a:latin typeface="Calibri Light" panose="020F0302020204030204" pitchFamily="34" charset="0"/>
+            </a:endParaRPr>
+          </a:p>
+        </p:txBody>
+      </p:sp>
+      <p:cxnSp>
+        <p:nvCxnSpPr>
+          <p:cNvPr id="7" name="Straight Arrow Connector 6"/>
+          <p:cNvCxnSpPr/>
+          <p:nvPr/>
+        </p:nvCxnSpPr>
+        <p:spPr>
+          <a:xfrm flipH="1">
+            <a:off x="5791200" y="2819400"/>
+            <a:ext cx="533400" cy="304800"/>
+          </a:xfrm>
+          <a:prstGeom prst="straightConnector1">
+            <a:avLst/>
+          </a:prstGeom>
+          <a:ln>
+            <a:tailEnd type="arrow"/>
+          </a:ln>
+        </p:spPr>
+        <p:style>
+          <a:lnRef idx="1">
+            <a:schemeClr val="accent1"/>
+          </a:lnRef>
+          <a:fillRef idx="0">
+            <a:schemeClr val="accent1"/>
+          </a:fillRef>
+          <a:effectRef idx="0">
+            <a:schemeClr val="accent1"/>
+          </a:effectRef>
+          <a:fontRef idx="minor">
+            <a:schemeClr val="tx1"/>
+          </a:fontRef>
+        </p:style>
+      </p:cxnSp>
+      <mc:AlternateContent xmlns:mc="http://schemas.openxmlformats.org/markup-compatibility/2006">
+        <mc:Choice xmlns:a14="http://schemas.microsoft.com/office/drawing/2010/main" Requires="a14">
+          <p:sp>
+            <p:nvSpPr>
+              <p:cNvPr id="9" name="TextBox 8"/>
+              <p:cNvSpPr txBox="1"/>
+              <p:nvPr/>
+            </p:nvSpPr>
+            <p:spPr>
+              <a:xfrm>
+                <a:off x="5919549" y="3240087"/>
+                <a:ext cx="846642" cy="369332"/>
+              </a:xfrm>
+              <a:prstGeom prst="rect">
+                <a:avLst/>
+              </a:prstGeom>
+              <a:noFill/>
+            </p:spPr>
+            <p:txBody>
+              <a:bodyPr wrap="none" rtlCol="0">
+                <a:spAutoFit/>
+              </a:bodyPr>
+              <a:lstStyle/>
+              <a:p>
+                <a14:m>
+                  <m:oMathPara xmlns:m="http://schemas.openxmlformats.org/officeDocument/2006/math">
+                    <m:oMathParaPr>
+                      <m:jc m:val="centerGroup"/>
+                    </m:oMathParaPr>
+                    <m:oMath xmlns:m="http://schemas.openxmlformats.org/officeDocument/2006/math">
+                      <m:sSub>
+                        <m:sSubPr>
+                          <m:ctrlPr>
+                            <a:rPr lang="en-US" b="0" i="1" smtClean="0">
+                              <a:latin typeface="Cambria Math"/>
+                            </a:rPr>
+                          </m:ctrlPr>
+                        </m:sSubPr>
+                        <m:e>
+                          <m:r>
+                            <a:rPr lang="en-US" b="0" i="1" smtClean="0">
+                              <a:latin typeface="Cambria Math"/>
+                            </a:rPr>
+                            <m:t>𝑙</m:t>
+                          </m:r>
+                        </m:e>
+                        <m:sub>
+                          <m:r>
+                            <a:rPr lang="en-US" b="0" i="1" smtClean="0">
+                              <a:latin typeface="Cambria Math"/>
+                            </a:rPr>
+                            <m:t>4</m:t>
+                          </m:r>
+                        </m:sub>
+                      </m:sSub>
+                      <m:r>
+                        <a:rPr lang="en-US" b="0" i="1" smtClean="0">
+                          <a:latin typeface="Cambria Math"/>
+                        </a:rPr>
+                        <m:t>=0</m:t>
+                      </m:r>
+                    </m:oMath>
+                  </m:oMathPara>
+                </a14:m>
+                <a:endParaRPr lang="en-US" dirty="0"/>
+              </a:p>
+            </p:txBody>
+          </p:sp>
+        </mc:Choice>
+        <mc:Fallback>
+          <p:sp>
+            <p:nvSpPr>
+              <p:cNvPr id="9" name="TextBox 8"/>
+              <p:cNvSpPr txBox="1">
+                <a:spLocks noRot="1" noChangeAspect="1" noMove="1" noResize="1" noEditPoints="1" noAdjustHandles="1" noChangeArrowheads="1" noChangeShapeType="1" noTextEdit="1"/>
+              </p:cNvSpPr>
+              <p:nvPr/>
+            </p:nvSpPr>
+            <p:spPr>
+              <a:xfrm>
+                <a:off x="5919549" y="3240087"/>
+                <a:ext cx="846642" cy="369332"/>
+              </a:xfrm>
+              <a:prstGeom prst="rect">
+                <a:avLst/>
+              </a:prstGeom>
+              <a:blipFill rotWithShape="1">
+                <a:blip r:embed="rId5"/>
+                <a:stretch>
+                  <a:fillRect/>
+                </a:stretch>
+              </a:blipFill>
+            </p:spPr>
+            <p:txBody>
+              <a:bodyPr/>
+              <a:lstStyle/>
+              <a:p>
+                <a:r>
+                  <a:rPr lang="en-US">
+                    <a:noFill/>
+                  </a:rPr>
+                  <a:t> </a:t>
+                </a:r>
+              </a:p>
+            </p:txBody>
+          </p:sp>
+        </mc:Fallback>
+      </mc:AlternateContent>
+      <mc:AlternateContent xmlns:mc="http://schemas.openxmlformats.org/markup-compatibility/2006">
+        <mc:Choice xmlns:a14="http://schemas.microsoft.com/office/drawing/2010/main" Requires="a14">
+          <p:sp>
+            <p:nvSpPr>
+              <p:cNvPr id="10" name="TextBox 9"/>
+              <p:cNvSpPr txBox="1"/>
+              <p:nvPr/>
+            </p:nvSpPr>
+            <p:spPr>
+              <a:xfrm>
+                <a:off x="3855472" y="1371600"/>
+                <a:ext cx="1324337" cy="369332"/>
+              </a:xfrm>
+              <a:prstGeom prst="rect">
+                <a:avLst/>
+              </a:prstGeom>
+              <a:noFill/>
+            </p:spPr>
+            <p:txBody>
+              <a:bodyPr wrap="none" rtlCol="0">
+                <a:spAutoFit/>
+              </a:bodyPr>
+              <a:lstStyle/>
+              <a:p>
+                <a14:m>
+                  <m:oMathPara xmlns:m="http://schemas.openxmlformats.org/officeDocument/2006/math">
+                    <m:oMathParaPr>
+                      <m:jc m:val="centerGroup"/>
+                    </m:oMathParaPr>
+                    <m:oMath xmlns:m="http://schemas.openxmlformats.org/officeDocument/2006/math">
+                      <m:sSub>
+                        <m:sSubPr>
+                          <m:ctrlPr>
+                            <a:rPr lang="en-US" b="0" i="1" smtClean="0">
+                              <a:latin typeface="Cambria Math"/>
+                            </a:rPr>
+                          </m:ctrlPr>
+                        </m:sSubPr>
+                        <m:e>
+                          <m:r>
+                            <a:rPr lang="en-US" b="0" i="1" smtClean="0">
+                              <a:latin typeface="Cambria Math"/>
+                            </a:rPr>
+                            <m:t>𝑙</m:t>
+                          </m:r>
+                        </m:e>
+                        <m:sub>
+                          <m:r>
+                            <a:rPr lang="en-US" b="0" i="1" smtClean="0">
+                              <a:latin typeface="Cambria Math"/>
+                            </a:rPr>
+                            <m:t>0</m:t>
+                          </m:r>
+                        </m:sub>
+                      </m:sSub>
+                      <m:r>
+                        <a:rPr lang="en-US" b="0" i="1" smtClean="0">
+                          <a:latin typeface="Cambria Math"/>
+                        </a:rPr>
+                        <m:t>=−2.33</m:t>
+                      </m:r>
+                    </m:oMath>
+                  </m:oMathPara>
+                </a14:m>
+                <a:endParaRPr lang="en-US" dirty="0"/>
+              </a:p>
+            </p:txBody>
+          </p:sp>
+        </mc:Choice>
+        <mc:Fallback>
+          <p:sp>
+            <p:nvSpPr>
+              <p:cNvPr id="10" name="TextBox 9"/>
+              <p:cNvSpPr txBox="1">
+                <a:spLocks noRot="1" noChangeAspect="1" noMove="1" noResize="1" noEditPoints="1" noAdjustHandles="1" noChangeArrowheads="1" noChangeShapeType="1" noTextEdit="1"/>
+              </p:cNvSpPr>
+              <p:nvPr/>
+            </p:nvSpPr>
+            <p:spPr>
+              <a:xfrm>
+                <a:off x="3855472" y="1371600"/>
+                <a:ext cx="1324337" cy="369332"/>
+              </a:xfrm>
+              <a:prstGeom prst="rect">
+                <a:avLst/>
+              </a:prstGeom>
+              <a:blipFill rotWithShape="1">
+                <a:blip r:embed="rId6"/>
+                <a:stretch>
+                  <a:fillRect/>
+                </a:stretch>
+              </a:blipFill>
+            </p:spPr>
+            <p:txBody>
+              <a:bodyPr/>
+              <a:lstStyle/>
+              <a:p>
+                <a:r>
+                  <a:rPr lang="en-US">
+                    <a:noFill/>
+                  </a:rPr>
+                  <a:t> </a:t>
+                </a:r>
+              </a:p>
+            </p:txBody>
+          </p:sp>
+        </mc:Fallback>
+      </mc:AlternateContent>
+      <mc:AlternateContent xmlns:mc="http://schemas.openxmlformats.org/markup-compatibility/2006">
+        <mc:Choice xmlns:a14="http://schemas.microsoft.com/office/drawing/2010/main" Requires="a14">
+          <p:sp>
+            <p:nvSpPr>
+              <p:cNvPr id="11" name="TextBox 10"/>
+              <p:cNvSpPr txBox="1"/>
+              <p:nvPr/>
+            </p:nvSpPr>
+            <p:spPr>
+              <a:xfrm>
+                <a:off x="1905000" y="2971800"/>
+                <a:ext cx="1324337" cy="369332"/>
+              </a:xfrm>
+              <a:prstGeom prst="rect">
+                <a:avLst/>
+              </a:prstGeom>
+              <a:noFill/>
+            </p:spPr>
+            <p:txBody>
+              <a:bodyPr wrap="none" rtlCol="0">
+                <a:spAutoFit/>
+              </a:bodyPr>
+              <a:lstStyle/>
+              <a:p>
+                <a14:m>
+                  <m:oMathPara xmlns:m="http://schemas.openxmlformats.org/officeDocument/2006/math">
+                    <m:oMathParaPr>
+                      <m:jc m:val="centerGroup"/>
+                    </m:oMathParaPr>
+                    <m:oMath xmlns:m="http://schemas.openxmlformats.org/officeDocument/2006/math">
+                      <m:sSub>
+                        <m:sSubPr>
+                          <m:ctrlPr>
+                            <a:rPr lang="en-US" b="0" i="1" smtClean="0">
+                              <a:latin typeface="Cambria Math"/>
+                            </a:rPr>
+                          </m:ctrlPr>
+                        </m:sSubPr>
+                        <m:e>
+                          <m:r>
+                            <a:rPr lang="en-US" b="0" i="1" smtClean="0">
+                              <a:latin typeface="Cambria Math"/>
+                            </a:rPr>
+                            <m:t>𝑙</m:t>
+                          </m:r>
+                        </m:e>
+                        <m:sub>
+                          <m:r>
+                            <a:rPr lang="en-US" b="0" i="1" smtClean="0">
+                              <a:latin typeface="Cambria Math"/>
+                            </a:rPr>
+                            <m:t>5</m:t>
+                          </m:r>
+                        </m:sub>
+                      </m:sSub>
+                      <m:r>
+                        <a:rPr lang="en-US" b="0" i="1" smtClean="0">
+                          <a:latin typeface="Cambria Math"/>
+                        </a:rPr>
+                        <m:t>=−2.33</m:t>
+                      </m:r>
+                    </m:oMath>
+                  </m:oMathPara>
+                </a14:m>
+                <a:endParaRPr lang="en-US" dirty="0"/>
+              </a:p>
+            </p:txBody>
+          </p:sp>
+        </mc:Choice>
+        <mc:Fallback>
+          <p:sp>
+            <p:nvSpPr>
+              <p:cNvPr id="11" name="TextBox 10"/>
+              <p:cNvSpPr txBox="1">
+                <a:spLocks noRot="1" noChangeAspect="1" noMove="1" noResize="1" noEditPoints="1" noAdjustHandles="1" noChangeArrowheads="1" noChangeShapeType="1" noTextEdit="1"/>
+              </p:cNvSpPr>
+              <p:nvPr/>
+            </p:nvSpPr>
+            <p:spPr>
+              <a:xfrm>
+                <a:off x="1905000" y="2971800"/>
+                <a:ext cx="1324337" cy="369332"/>
+              </a:xfrm>
+              <a:prstGeom prst="rect">
+                <a:avLst/>
+              </a:prstGeom>
+              <a:blipFill rotWithShape="1">
+                <a:blip r:embed="rId7"/>
+                <a:stretch>
+                  <a:fillRect/>
+                </a:stretch>
+              </a:blipFill>
+            </p:spPr>
+            <p:txBody>
+              <a:bodyPr/>
+              <a:lstStyle/>
+              <a:p>
+                <a:r>
+                  <a:rPr lang="en-US">
+                    <a:noFill/>
+                  </a:rPr>
+                  <a:t> </a:t>
+                </a:r>
+              </a:p>
+            </p:txBody>
+          </p:sp>
+        </mc:Fallback>
+      </mc:AlternateContent>
+      <mc:AlternateContent xmlns:mc="http://schemas.openxmlformats.org/markup-compatibility/2006">
+        <mc:Choice xmlns:a14="http://schemas.microsoft.com/office/drawing/2010/main" Requires="a14">
+          <p:sp>
+            <p:nvSpPr>
+              <p:cNvPr id="12" name="TextBox 11"/>
+              <p:cNvSpPr txBox="1"/>
+              <p:nvPr/>
+            </p:nvSpPr>
+            <p:spPr>
+              <a:xfrm>
+                <a:off x="838200" y="4807259"/>
+                <a:ext cx="1319015" cy="369332"/>
+              </a:xfrm>
+              <a:prstGeom prst="rect">
+                <a:avLst/>
+              </a:prstGeom>
+              <a:noFill/>
+            </p:spPr>
+            <p:txBody>
+              <a:bodyPr wrap="none" rtlCol="0">
+                <a:spAutoFit/>
+              </a:bodyPr>
+              <a:lstStyle/>
+              <a:p>
+                <a14:m>
+                  <m:oMathPara xmlns:m="http://schemas.openxmlformats.org/officeDocument/2006/math">
+                    <m:oMathParaPr>
+                      <m:jc m:val="centerGroup"/>
+                    </m:oMathParaPr>
+                    <m:oMath xmlns:m="http://schemas.openxmlformats.org/officeDocument/2006/math">
+                      <m:sSub>
+                        <m:sSubPr>
+                          <m:ctrlPr>
+                            <a:rPr lang="en-US" b="0" i="1" smtClean="0">
+                              <a:latin typeface="Cambria Math"/>
+                            </a:rPr>
+                          </m:ctrlPr>
+                        </m:sSubPr>
+                        <m:e>
+                          <m:r>
+                            <a:rPr lang="en-US" b="0" i="1" smtClean="0">
+                              <a:latin typeface="Cambria Math"/>
+                            </a:rPr>
+                            <m:t>𝑙</m:t>
+                          </m:r>
+                        </m:e>
+                        <m:sub>
+                          <m:r>
+                            <a:rPr lang="en-US" b="0" i="1" smtClean="0">
+                              <a:latin typeface="Cambria Math"/>
+                            </a:rPr>
+                            <m:t>1</m:t>
+                          </m:r>
+                        </m:sub>
+                      </m:sSub>
+                      <m:r>
+                        <a:rPr lang="en-US" b="0" i="1" smtClean="0">
+                          <a:latin typeface="Cambria Math"/>
+                        </a:rPr>
+                        <m:t>=−2.33</m:t>
+                      </m:r>
+                    </m:oMath>
+                  </m:oMathPara>
+                </a14:m>
+                <a:endParaRPr lang="en-US" dirty="0"/>
+              </a:p>
+            </p:txBody>
+          </p:sp>
+        </mc:Choice>
+        <mc:Fallback>
+          <p:sp>
+            <p:nvSpPr>
+              <p:cNvPr id="12" name="TextBox 11"/>
+              <p:cNvSpPr txBox="1">
+                <a:spLocks noRot="1" noChangeAspect="1" noMove="1" noResize="1" noEditPoints="1" noAdjustHandles="1" noChangeArrowheads="1" noChangeShapeType="1" noTextEdit="1"/>
+              </p:cNvSpPr>
+              <p:nvPr/>
+            </p:nvSpPr>
+            <p:spPr>
+              <a:xfrm>
+                <a:off x="838200" y="4807259"/>
+                <a:ext cx="1319015" cy="369332"/>
+              </a:xfrm>
+              <a:prstGeom prst="rect">
+                <a:avLst/>
+              </a:prstGeom>
+              <a:blipFill rotWithShape="1">
+                <a:blip r:embed="rId8"/>
+                <a:stretch>
+                  <a:fillRect/>
+                </a:stretch>
+              </a:blipFill>
+            </p:spPr>
+            <p:txBody>
+              <a:bodyPr/>
+              <a:lstStyle/>
+              <a:p>
+                <a:r>
+                  <a:rPr lang="en-US">
+                    <a:noFill/>
+                  </a:rPr>
+                  <a:t> </a:t>
+                </a:r>
+              </a:p>
+            </p:txBody>
+          </p:sp>
+        </mc:Fallback>
+      </mc:AlternateContent>
+    </p:spTree>
+    <p:extLst>
+      <p:ext uri="{BB962C8B-B14F-4D97-AF65-F5344CB8AC3E}">
+        <p14:creationId xmlns:p14="http://schemas.microsoft.com/office/powerpoint/2010/main" val="2543902335"/>
+      </p:ext>
+    </p:extLst>
+  </p:cSld>
+  <p:clrMapOvr>
+    <a:masterClrMapping/>
+  </p:clrMapOvr>
+  <p:timing>
+    <p:tnLst>
+      <p:par>
+        <p:cTn id="1" dur="indefinite" restart="never" nodeType="tmRoot">
+          <p:childTnLst>
+            <p:seq concurrent="1" nextAc="seek">
+              <p:cTn id="2" dur="indefinite" nodeType="mainSeq">
+                <p:childTnLst>
+                  <p:par>
+                    <p:cTn id="3" fill="hold">
+                      <p:stCondLst>
+                        <p:cond delay="indefinite"/>
+                      </p:stCondLst>
+                      <p:childTnLst>
+                        <p:par>
+                          <p:cTn id="4" fill="hold">
+                            <p:stCondLst>
+                              <p:cond delay="0"/>
+                            </p:stCondLst>
+                            <p:childTnLst>
+                              <p:par>
+                                <p:cTn id="5" presetID="1" presetClass="entr" presetSubtype="0" fill="hold" grpId="0" nodeType="clickEffect">
+                                  <p:stCondLst>
+                                    <p:cond delay="0"/>
+                                  </p:stCondLst>
+                                  <p:childTnLst>
+                                    <p:set>
+                                      <p:cBhvr>
+                                        <p:cTn id="6" dur="1" fill="hold">
+                                          <p:stCondLst>
+                                            <p:cond delay="0"/>
+                                          </p:stCondLst>
+                                        </p:cTn>
+                                        <p:tgtEl>
+                                          <p:spTgt spid="12"/>
+                                        </p:tgtEl>
+                                        <p:attrNameLst>
+                                          <p:attrName>style.visibility</p:attrName>
+                                        </p:attrNameLst>
+                                      </p:cBhvr>
+                                      <p:to>
+                                        <p:strVal val="visible"/>
+                                      </p:to>
+                                    </p:set>
+                                  </p:childTnLst>
+                                </p:cTn>
+                              </p:par>
+                              <p:par>
+                                <p:cTn id="7" presetID="1" presetClass="entr" presetSubtype="0" fill="hold" grpId="0" nodeType="withEffect">
+                                  <p:stCondLst>
+                                    <p:cond delay="0"/>
+                                  </p:stCondLst>
+                                  <p:childTnLst>
+                                    <p:set>
+                                      <p:cBhvr>
+                                        <p:cTn id="8" dur="1" fill="hold">
+                                          <p:stCondLst>
+                                            <p:cond delay="0"/>
+                                          </p:stCondLst>
+                                        </p:cTn>
+                                        <p:tgtEl>
+                                          <p:spTgt spid="11"/>
+                                        </p:tgtEl>
+                                        <p:attrNameLst>
+                                          <p:attrName>style.visibility</p:attrName>
+                                        </p:attrNameLst>
+                                      </p:cBhvr>
+                                      <p:to>
+                                        <p:strVal val="visible"/>
+                                      </p:to>
+                                    </p:set>
+                                  </p:childTnLst>
+                                </p:cTn>
+                              </p:par>
+                              <p:par>
+                                <p:cTn id="9" presetID="1" presetClass="entr" presetSubtype="0" fill="hold" grpId="0" nodeType="withEffect">
+                                  <p:stCondLst>
+                                    <p:cond delay="0"/>
+                                  </p:stCondLst>
+                                  <p:childTnLst>
+                                    <p:set>
+                                      <p:cBhvr>
+                                        <p:cTn id="10" dur="1" fill="hold">
+                                          <p:stCondLst>
+                                            <p:cond delay="0"/>
+                                          </p:stCondLst>
+                                        </p:cTn>
+                                        <p:tgtEl>
+                                          <p:spTgt spid="10"/>
+                                        </p:tgtEl>
+                                        <p:attrNameLst>
+                                          <p:attrName>style.visibility</p:attrName>
+                                        </p:attrNameLst>
+                                      </p:cBhvr>
+                                      <p:to>
+                                        <p:strVal val="visible"/>
+                                      </p:to>
+                                    </p:set>
+                                  </p:childTnLst>
+                                </p:cTn>
+                              </p:par>
+                              <p:par>
+                                <p:cTn id="11" presetID="1" presetClass="entr" presetSubtype="0" fill="hold" grpId="0" nodeType="withEffect">
+                                  <p:stCondLst>
+                                    <p:cond delay="0"/>
+                                  </p:stCondLst>
+                                  <p:childTnLst>
+                                    <p:set>
+                                      <p:cBhvr>
+                                        <p:cTn id="12" dur="1" fill="hold">
+                                          <p:stCondLst>
+                                            <p:cond delay="0"/>
+                                          </p:stCondLst>
+                                        </p:cTn>
+                                        <p:tgtEl>
+                                          <p:spTgt spid="9"/>
+                                        </p:tgtEl>
+                                        <p:attrNameLst>
+                                          <p:attrName>style.visibility</p:attrName>
+                                        </p:attrNameLst>
+                                      </p:cBhvr>
+                                      <p:to>
+                                        <p:strVal val="visible"/>
+                                      </p:to>
+                                    </p:set>
+                                  </p:childTnLst>
+                                </p:cTn>
+                              </p:par>
+                            </p:childTnLst>
+                          </p:cTn>
+                        </p:par>
+                      </p:childTnLst>
+                    </p:cTn>
+                  </p:par>
+                </p:childTnLst>
+              </p:cTn>
+              <p:prevCondLst>
+                <p:cond evt="onPrev" delay="0">
+                  <p:tgtEl>
+                    <p:sldTgt/>
+                  </p:tgtEl>
+                </p:cond>
+              </p:prevCondLst>
+              <p:nextCondLst>
+                <p:cond evt="onNext" delay="0">
+                  <p:tgtEl>
+                    <p:sldTgt/>
+                  </p:tgtEl>
+                </p:cond>
+              </p:nextCondLst>
+            </p:seq>
+          </p:childTnLst>
+        </p:cTn>
+      </p:par>
+    </p:tnLst>
+    <p:bldLst>
+      <p:bldP spid="9" grpId="0"/>
+      <p:bldP spid="10" grpId="0"/>
+      <p:bldP spid="11" grpId="0"/>
+      <p:bldP spid="12" grpId="0"/>
+    </p:bldLst>
+  </p:timing>
+</p:sld>
+</file>
+
+<file path=ppt/slides/slide15.xml><?xml version="1.0" encoding="utf-8"?>
 <p:sld xmlns:a="http://schemas.openxmlformats.org/drawingml/2006/main" xmlns:r="http://schemas.openxmlformats.org/officeDocument/2006/relationships" xmlns:p="http://schemas.openxmlformats.org/presentationml/2006/main">
   <p:cSld>
     <p:spTree>
@@ -5268,7 +6668,7 @@
 </p:sld>
 </file>
 
-<file path=ppt/slides/slide14.xml><?xml version="1.0" encoding="utf-8"?>
+<file path=ppt/slides/slide16.xml><?xml version="1.0" encoding="utf-8"?>
 <p:sld xmlns:a="http://schemas.openxmlformats.org/drawingml/2006/main" xmlns:r="http://schemas.openxmlformats.org/officeDocument/2006/relationships" xmlns:p="http://schemas.openxmlformats.org/presentationml/2006/main">
   <p:cSld>
     <p:spTree>
@@ -5310,27 +6710,1084 @@
       </p:sp>
       <p:sp>
         <p:nvSpPr>
-          <p:cNvPr id="3" name="Content Placeholder 2"/>
-          <p:cNvSpPr>
-            <a:spLocks noGrp="1"/>
-          </p:cNvSpPr>
-          <p:nvPr>
-            <p:ph idx="1"/>
-          </p:nvPr>
+          <p:cNvPr id="5" name="TextBox 4"/>
+          <p:cNvSpPr txBox="1"/>
+          <p:nvPr/>
         </p:nvSpPr>
-        <p:spPr/>
+        <p:spPr>
+          <a:xfrm>
+            <a:off x="1095877" y="1387495"/>
+            <a:ext cx="2023311" cy="461665"/>
+          </a:xfrm>
+          <a:prstGeom prst="rect">
+            <a:avLst/>
+          </a:prstGeom>
+          <a:noFill/>
+        </p:spPr>
         <p:txBody>
-          <a:bodyPr/>
+          <a:bodyPr wrap="none" rtlCol="0">
+            <a:spAutoFit/>
+          </a:bodyPr>
           <a:lstStyle/>
           <a:p>
-            <a:endParaRPr lang="en-US"/>
+            <a:r>
+              <a:rPr lang="en-US" sz="2400" dirty="0" smtClean="0">
+                <a:latin typeface="Adobe Fan Heiti Std B" pitchFamily="34" charset="-128"/>
+                <a:ea typeface="Adobe Fan Heiti Std B" pitchFamily="34" charset="-128"/>
+              </a:rPr>
+              <a:t>Regular trees</a:t>
+            </a:r>
+            <a:endParaRPr lang="en-US" sz="2400" dirty="0">
+              <a:latin typeface="Adobe Fan Heiti Std B" pitchFamily="34" charset="-128"/>
+              <a:ea typeface="Adobe Fan Heiti Std B" pitchFamily="34" charset="-128"/>
+            </a:endParaRPr>
           </a:p>
         </p:txBody>
       </p:sp>
+      <p:grpSp>
+        <p:nvGrpSpPr>
+          <p:cNvPr id="19" name="Group 18"/>
+          <p:cNvGrpSpPr/>
+          <p:nvPr/>
+        </p:nvGrpSpPr>
+        <p:grpSpPr>
+          <a:xfrm>
+            <a:off x="-228600" y="2009774"/>
+            <a:ext cx="5486400" cy="4238625"/>
+            <a:chOff x="228600" y="2057400"/>
+            <a:chExt cx="5486400" cy="4238625"/>
+          </a:xfrm>
+        </p:grpSpPr>
+        <p:graphicFrame>
+          <p:nvGraphicFramePr>
+            <p:cNvPr id="4" name="Object 3"/>
+            <p:cNvGraphicFramePr>
+              <a:graphicFrameLocks/>
+            </p:cNvGraphicFramePr>
+            <p:nvPr>
+              <p:extLst>
+                <p:ext uri="{D42A27DB-BD31-4B8C-83A1-F6EECF244321}">
+                  <p14:modId xmlns:p14="http://schemas.microsoft.com/office/powerpoint/2010/main" val="1983044631"/>
+                </p:ext>
+              </p:extLst>
+            </p:nvPr>
+          </p:nvGraphicFramePr>
+          <p:xfrm>
+            <a:off x="228600" y="2057400"/>
+            <a:ext cx="5486400" cy="4238625"/>
+          </p:xfrm>
+          <a:graphic>
+            <a:graphicData uri="http://schemas.openxmlformats.org/presentationml/2006/ole">
+              <mc:AlternateContent xmlns:mc="http://schemas.openxmlformats.org/markup-compatibility/2006">
+                <mc:Choice xmlns:v="urn:schemas-microsoft-com:vml" Requires="v">
+                  <p:oleObj spid="_x0000_s8206" name="Visio" r:id="rId3" imgW="5647860" imgH="4300268" progId="Visio.Drawing.11">
+                    <p:embed/>
+                  </p:oleObj>
+                </mc:Choice>
+                <mc:Fallback>
+                  <p:oleObj name="Visio" r:id="rId3" imgW="5647860" imgH="4300268" progId="Visio.Drawing.11">
+                    <p:embed/>
+                    <p:pic>
+                      <p:nvPicPr>
+                        <p:cNvPr id="0" name="Object 3"/>
+                        <p:cNvPicPr>
+                          <a:picLocks noChangeArrowheads="1"/>
+                        </p:cNvPicPr>
+                        <p:nvPr/>
+                      </p:nvPicPr>
+                      <p:blipFill>
+                        <a:blip r:embed="rId4"/>
+                        <a:srcRect/>
+                        <a:stretch>
+                          <a:fillRect/>
+                        </a:stretch>
+                      </p:blipFill>
+                      <p:spPr bwMode="auto">
+                        <a:xfrm>
+                          <a:off x="228600" y="2057400"/>
+                          <a:ext cx="5486400" cy="4238625"/>
+                        </a:xfrm>
+                        <a:prstGeom prst="rect">
+                          <a:avLst/>
+                        </a:prstGeom>
+                        <a:noFill/>
+                        <a:ln>
+                          <a:noFill/>
+                        </a:ln>
+                        <a:extLst>
+                          <a:ext uri="{909E8E84-426E-40DD-AFC4-6F175D3DCCD1}">
+                            <a14:hiddenFill xmlns:a14="http://schemas.microsoft.com/office/drawing/2010/main">
+                              <a:solidFill>
+                                <a:srgbClr val="FFFFFF"/>
+                              </a:solidFill>
+                            </a14:hiddenFill>
+                          </a:ext>
+                          <a:ext uri="{91240B29-F687-4F45-9708-019B960494DF}">
+                            <a14:hiddenLine xmlns:a14="http://schemas.microsoft.com/office/drawing/2010/main" w="9525">
+                              <a:solidFill>
+                                <a:srgbClr val="000000"/>
+                              </a:solidFill>
+                              <a:miter lim="800000"/>
+                              <a:headEnd/>
+                              <a:tailEnd/>
+                            </a14:hiddenLine>
+                          </a:ext>
+                        </a:extLst>
+                      </p:spPr>
+                    </p:pic>
+                  </p:oleObj>
+                </mc:Fallback>
+              </mc:AlternateContent>
+            </a:graphicData>
+          </a:graphic>
+        </p:graphicFrame>
+        <p:cxnSp>
+          <p:nvCxnSpPr>
+            <p:cNvPr id="7" name="Straight Arrow Connector 6"/>
+            <p:cNvCxnSpPr/>
+            <p:nvPr/>
+          </p:nvCxnSpPr>
+          <p:spPr>
+            <a:xfrm flipH="1" flipV="1">
+              <a:off x="1828800" y="3505200"/>
+              <a:ext cx="249655" cy="152400"/>
+            </a:xfrm>
+            <a:prstGeom prst="straightConnector1">
+              <a:avLst/>
+            </a:prstGeom>
+            <a:ln>
+              <a:tailEnd type="arrow"/>
+            </a:ln>
+          </p:spPr>
+          <p:style>
+            <a:lnRef idx="1">
+              <a:schemeClr val="accent1"/>
+            </a:lnRef>
+            <a:fillRef idx="0">
+              <a:schemeClr val="accent1"/>
+            </a:fillRef>
+            <a:effectRef idx="0">
+              <a:schemeClr val="accent1"/>
+            </a:effectRef>
+            <a:fontRef idx="minor">
+              <a:schemeClr val="tx1"/>
+            </a:fontRef>
+          </p:style>
+        </p:cxnSp>
+        <p:cxnSp>
+          <p:nvCxnSpPr>
+            <p:cNvPr id="8" name="Straight Arrow Connector 7"/>
+            <p:cNvCxnSpPr/>
+            <p:nvPr/>
+          </p:nvCxnSpPr>
+          <p:spPr>
+            <a:xfrm flipH="1">
+              <a:off x="2078455" y="4267200"/>
+              <a:ext cx="229704" cy="152400"/>
+            </a:xfrm>
+            <a:prstGeom prst="straightConnector1">
+              <a:avLst/>
+            </a:prstGeom>
+            <a:ln>
+              <a:tailEnd type="arrow"/>
+            </a:ln>
+          </p:spPr>
+          <p:style>
+            <a:lnRef idx="1">
+              <a:schemeClr val="accent1"/>
+            </a:lnRef>
+            <a:fillRef idx="0">
+              <a:schemeClr val="accent1"/>
+            </a:fillRef>
+            <a:effectRef idx="0">
+              <a:schemeClr val="accent1"/>
+            </a:effectRef>
+            <a:fontRef idx="minor">
+              <a:schemeClr val="tx1"/>
+            </a:fontRef>
+          </p:style>
+        </p:cxnSp>
+        <p:cxnSp>
+          <p:nvCxnSpPr>
+            <p:cNvPr id="12" name="Straight Arrow Connector 11"/>
+            <p:cNvCxnSpPr/>
+            <p:nvPr/>
+          </p:nvCxnSpPr>
+          <p:spPr>
+            <a:xfrm flipV="1">
+              <a:off x="2972904" y="2971800"/>
+              <a:ext cx="117207" cy="152400"/>
+            </a:xfrm>
+            <a:prstGeom prst="straightConnector1">
+              <a:avLst/>
+            </a:prstGeom>
+            <a:ln>
+              <a:tailEnd type="arrow"/>
+            </a:ln>
+          </p:spPr>
+          <p:style>
+            <a:lnRef idx="1">
+              <a:schemeClr val="accent1"/>
+            </a:lnRef>
+            <a:fillRef idx="0">
+              <a:schemeClr val="accent1"/>
+            </a:fillRef>
+            <a:effectRef idx="0">
+              <a:schemeClr val="accent1"/>
+            </a:effectRef>
+            <a:fontRef idx="minor">
+              <a:schemeClr val="tx1"/>
+            </a:fontRef>
+          </p:style>
+        </p:cxnSp>
+        <p:cxnSp>
+          <p:nvCxnSpPr>
+            <p:cNvPr id="14" name="Straight Arrow Connector 13"/>
+            <p:cNvCxnSpPr/>
+            <p:nvPr/>
+          </p:nvCxnSpPr>
+          <p:spPr>
+            <a:xfrm flipH="1">
+              <a:off x="3031507" y="4038600"/>
+              <a:ext cx="2557" cy="228600"/>
+            </a:xfrm>
+            <a:prstGeom prst="straightConnector1">
+              <a:avLst/>
+            </a:prstGeom>
+            <a:ln>
+              <a:tailEnd type="arrow"/>
+            </a:ln>
+          </p:spPr>
+          <p:style>
+            <a:lnRef idx="1">
+              <a:schemeClr val="accent1"/>
+            </a:lnRef>
+            <a:fillRef idx="0">
+              <a:schemeClr val="accent1"/>
+            </a:fillRef>
+            <a:effectRef idx="0">
+              <a:schemeClr val="accent1"/>
+            </a:effectRef>
+            <a:fontRef idx="minor">
+              <a:schemeClr val="tx1"/>
+            </a:fontRef>
+          </p:style>
+        </p:cxnSp>
+        <p:cxnSp>
+          <p:nvCxnSpPr>
+            <p:cNvPr id="16" name="Straight Arrow Connector 15"/>
+            <p:cNvCxnSpPr/>
+            <p:nvPr/>
+          </p:nvCxnSpPr>
+          <p:spPr>
+            <a:xfrm flipV="1">
+              <a:off x="3658704" y="3657600"/>
+              <a:ext cx="227496" cy="110490"/>
+            </a:xfrm>
+            <a:prstGeom prst="straightConnector1">
+              <a:avLst/>
+            </a:prstGeom>
+            <a:ln>
+              <a:tailEnd type="arrow"/>
+            </a:ln>
+          </p:spPr>
+          <p:style>
+            <a:lnRef idx="1">
+              <a:schemeClr val="accent1"/>
+            </a:lnRef>
+            <a:fillRef idx="0">
+              <a:schemeClr val="accent1"/>
+            </a:fillRef>
+            <a:effectRef idx="0">
+              <a:schemeClr val="accent1"/>
+            </a:effectRef>
+            <a:fontRef idx="minor">
+              <a:schemeClr val="tx1"/>
+            </a:fontRef>
+          </p:style>
+        </p:cxnSp>
+      </p:grpSp>
+      <p:cxnSp>
+        <p:nvCxnSpPr>
+          <p:cNvPr id="20" name="Straight Arrow Connector 19"/>
+          <p:cNvCxnSpPr/>
+          <p:nvPr/>
+        </p:nvCxnSpPr>
+        <p:spPr>
+          <a:xfrm flipH="1">
+            <a:off x="1992681" y="3512819"/>
+            <a:ext cx="229704" cy="152400"/>
+          </a:xfrm>
+          <a:prstGeom prst="straightConnector1">
+            <a:avLst/>
+          </a:prstGeom>
+          <a:ln>
+            <a:tailEnd type="arrow"/>
+          </a:ln>
+        </p:spPr>
+        <p:style>
+          <a:lnRef idx="1">
+            <a:schemeClr val="accent1"/>
+          </a:lnRef>
+          <a:fillRef idx="0">
+            <a:schemeClr val="accent1"/>
+          </a:fillRef>
+          <a:effectRef idx="0">
+            <a:schemeClr val="accent1"/>
+          </a:effectRef>
+          <a:fontRef idx="minor">
+            <a:schemeClr val="tx1"/>
+          </a:fontRef>
+        </p:style>
+      </p:cxnSp>
+      <p:sp>
+        <p:nvSpPr>
+          <p:cNvPr id="21" name="TextBox 20"/>
+          <p:cNvSpPr txBox="1"/>
+          <p:nvPr/>
+        </p:nvSpPr>
+        <p:spPr>
+          <a:xfrm>
+            <a:off x="583108" y="5638800"/>
+            <a:ext cx="3048848" cy="369332"/>
+          </a:xfrm>
+          <a:prstGeom prst="rect">
+            <a:avLst/>
+          </a:prstGeom>
+          <a:noFill/>
+        </p:spPr>
+        <p:txBody>
+          <a:bodyPr wrap="none" rtlCol="0">
+            <a:spAutoFit/>
+          </a:bodyPr>
+          <a:lstStyle/>
+          <a:p>
+            <a:pPr algn="ctr"/>
+            <a:r>
+              <a:rPr lang="en-US" dirty="0" smtClean="0">
+                <a:latin typeface="Calibri Light" panose="020F0302020204030204" pitchFamily="34" charset="0"/>
+              </a:rPr>
+              <a:t>(Assume this is an infinite tree)</a:t>
+            </a:r>
+            <a:endParaRPr lang="en-US" dirty="0">
+              <a:latin typeface="Calibri Light" panose="020F0302020204030204" pitchFamily="34" charset="0"/>
+            </a:endParaRPr>
+          </a:p>
+        </p:txBody>
+      </p:sp>
+      <p:graphicFrame>
+        <p:nvGraphicFramePr>
+          <p:cNvPr id="23" name="Object 22"/>
+          <p:cNvGraphicFramePr>
+            <a:graphicFrameLocks/>
+          </p:cNvGraphicFramePr>
+          <p:nvPr>
+            <p:extLst>
+              <p:ext uri="{D42A27DB-BD31-4B8C-83A1-F6EECF244321}">
+                <p14:modId xmlns:p14="http://schemas.microsoft.com/office/powerpoint/2010/main" val="272995770"/>
+              </p:ext>
+            </p:extLst>
+          </p:nvPr>
+        </p:nvGraphicFramePr>
+        <p:xfrm>
+          <a:off x="4039704" y="1936193"/>
+          <a:ext cx="5486400" cy="4238625"/>
+        </p:xfrm>
+        <a:graphic>
+          <a:graphicData uri="http://schemas.openxmlformats.org/presentationml/2006/ole">
+            <mc:AlternateContent xmlns:mc="http://schemas.openxmlformats.org/markup-compatibility/2006">
+              <mc:Choice xmlns:v="urn:schemas-microsoft-com:vml" Requires="v">
+                <p:oleObj spid="_x0000_s8207" name="Visio" r:id="rId5" imgW="5647860" imgH="4300268" progId="Visio.Drawing.11">
+                  <p:embed/>
+                </p:oleObj>
+              </mc:Choice>
+              <mc:Fallback>
+                <p:oleObj name="Visio" r:id="rId5" imgW="5647860" imgH="4300268" progId="Visio.Drawing.11">
+                  <p:embed/>
+                  <p:pic>
+                    <p:nvPicPr>
+                      <p:cNvPr id="0" name=""/>
+                      <p:cNvPicPr>
+                        <a:picLocks noChangeArrowheads="1"/>
+                      </p:cNvPicPr>
+                      <p:nvPr/>
+                    </p:nvPicPr>
+                    <p:blipFill>
+                      <a:blip r:embed="rId6"/>
+                      <a:srcRect/>
+                      <a:stretch>
+                        <a:fillRect/>
+                      </a:stretch>
+                    </p:blipFill>
+                    <p:spPr bwMode="auto">
+                      <a:xfrm>
+                        <a:off x="4039704" y="1936193"/>
+                        <a:ext cx="5486400" cy="4238625"/>
+                      </a:xfrm>
+                      <a:prstGeom prst="rect">
+                        <a:avLst/>
+                      </a:prstGeom>
+                      <a:noFill/>
+                      <a:ln>
+                        <a:noFill/>
+                      </a:ln>
+                      <a:extLst>
+                        <a:ext uri="{909E8E84-426E-40DD-AFC4-6F175D3DCCD1}">
+                          <a14:hiddenFill xmlns:a14="http://schemas.microsoft.com/office/drawing/2010/main">
+                            <a:solidFill>
+                              <a:srgbClr val="FFFFFF"/>
+                            </a:solidFill>
+                          </a14:hiddenFill>
+                        </a:ext>
+                        <a:ext uri="{91240B29-F687-4F45-9708-019B960494DF}">
+                          <a14:hiddenLine xmlns:a14="http://schemas.microsoft.com/office/drawing/2010/main" w="9525">
+                            <a:solidFill>
+                              <a:srgbClr val="000000"/>
+                            </a:solidFill>
+                            <a:miter lim="800000"/>
+                            <a:headEnd/>
+                            <a:tailEnd/>
+                          </a14:hiddenLine>
+                        </a:ext>
+                      </a:extLst>
+                    </p:spPr>
+                  </p:pic>
+                </p:oleObj>
+              </mc:Fallback>
+            </mc:AlternateContent>
+          </a:graphicData>
+        </a:graphic>
+      </p:graphicFrame>
+      <p:cxnSp>
+        <p:nvCxnSpPr>
+          <p:cNvPr id="24" name="Straight Arrow Connector 23"/>
+          <p:cNvCxnSpPr/>
+          <p:nvPr/>
+        </p:nvCxnSpPr>
+        <p:spPr>
+          <a:xfrm flipH="1" flipV="1">
+            <a:off x="5639904" y="3383993"/>
+            <a:ext cx="249655" cy="152400"/>
+          </a:xfrm>
+          <a:prstGeom prst="straightConnector1">
+            <a:avLst/>
+          </a:prstGeom>
+          <a:ln>
+            <a:tailEnd type="arrow"/>
+          </a:ln>
+        </p:spPr>
+        <p:style>
+          <a:lnRef idx="1">
+            <a:schemeClr val="accent1"/>
+          </a:lnRef>
+          <a:fillRef idx="0">
+            <a:schemeClr val="accent1"/>
+          </a:fillRef>
+          <a:effectRef idx="0">
+            <a:schemeClr val="accent1"/>
+          </a:effectRef>
+          <a:fontRef idx="minor">
+            <a:schemeClr val="tx1"/>
+          </a:fontRef>
+        </p:style>
+      </p:cxnSp>
+      <p:cxnSp>
+        <p:nvCxnSpPr>
+          <p:cNvPr id="25" name="Straight Arrow Connector 24"/>
+          <p:cNvCxnSpPr/>
+          <p:nvPr/>
+        </p:nvCxnSpPr>
+        <p:spPr>
+          <a:xfrm flipH="1">
+            <a:off x="5889559" y="4145993"/>
+            <a:ext cx="229704" cy="152400"/>
+          </a:xfrm>
+          <a:prstGeom prst="straightConnector1">
+            <a:avLst/>
+          </a:prstGeom>
+          <a:ln>
+            <a:tailEnd type="arrow"/>
+          </a:ln>
+        </p:spPr>
+        <p:style>
+          <a:lnRef idx="1">
+            <a:schemeClr val="accent1"/>
+          </a:lnRef>
+          <a:fillRef idx="0">
+            <a:schemeClr val="accent1"/>
+          </a:fillRef>
+          <a:effectRef idx="0">
+            <a:schemeClr val="accent1"/>
+          </a:effectRef>
+          <a:fontRef idx="minor">
+            <a:schemeClr val="tx1"/>
+          </a:fontRef>
+        </p:style>
+      </p:cxnSp>
+      <p:cxnSp>
+        <p:nvCxnSpPr>
+          <p:cNvPr id="26" name="Straight Arrow Connector 25"/>
+          <p:cNvCxnSpPr/>
+          <p:nvPr/>
+        </p:nvCxnSpPr>
+        <p:spPr>
+          <a:xfrm flipV="1">
+            <a:off x="6784008" y="2850593"/>
+            <a:ext cx="117207" cy="152400"/>
+          </a:xfrm>
+          <a:prstGeom prst="straightConnector1">
+            <a:avLst/>
+          </a:prstGeom>
+          <a:ln>
+            <a:tailEnd type="arrow"/>
+          </a:ln>
+        </p:spPr>
+        <p:style>
+          <a:lnRef idx="1">
+            <a:schemeClr val="accent1"/>
+          </a:lnRef>
+          <a:fillRef idx="0">
+            <a:schemeClr val="accent1"/>
+          </a:fillRef>
+          <a:effectRef idx="0">
+            <a:schemeClr val="accent1"/>
+          </a:effectRef>
+          <a:fontRef idx="minor">
+            <a:schemeClr val="tx1"/>
+          </a:fontRef>
+        </p:style>
+      </p:cxnSp>
+      <p:cxnSp>
+        <p:nvCxnSpPr>
+          <p:cNvPr id="27" name="Straight Arrow Connector 26"/>
+          <p:cNvCxnSpPr/>
+          <p:nvPr/>
+        </p:nvCxnSpPr>
+        <p:spPr>
+          <a:xfrm flipH="1">
+            <a:off x="6842611" y="3886200"/>
+            <a:ext cx="2557" cy="228600"/>
+          </a:xfrm>
+          <a:prstGeom prst="straightConnector1">
+            <a:avLst/>
+          </a:prstGeom>
+          <a:ln>
+            <a:tailEnd type="arrow"/>
+          </a:ln>
+        </p:spPr>
+        <p:style>
+          <a:lnRef idx="1">
+            <a:schemeClr val="accent1"/>
+          </a:lnRef>
+          <a:fillRef idx="0">
+            <a:schemeClr val="accent1"/>
+          </a:fillRef>
+          <a:effectRef idx="0">
+            <a:schemeClr val="accent1"/>
+          </a:effectRef>
+          <a:fontRef idx="minor">
+            <a:schemeClr val="tx1"/>
+          </a:fontRef>
+        </p:style>
+      </p:cxnSp>
+      <p:cxnSp>
+        <p:nvCxnSpPr>
+          <p:cNvPr id="28" name="Straight Arrow Connector 27"/>
+          <p:cNvCxnSpPr/>
+          <p:nvPr/>
+        </p:nvCxnSpPr>
+        <p:spPr>
+          <a:xfrm flipV="1">
+            <a:off x="7469808" y="3536393"/>
+            <a:ext cx="227496" cy="110490"/>
+          </a:xfrm>
+          <a:prstGeom prst="straightConnector1">
+            <a:avLst/>
+          </a:prstGeom>
+          <a:ln>
+            <a:tailEnd type="arrow"/>
+          </a:ln>
+        </p:spPr>
+        <p:style>
+          <a:lnRef idx="1">
+            <a:schemeClr val="accent1"/>
+          </a:lnRef>
+          <a:fillRef idx="0">
+            <a:schemeClr val="accent1"/>
+          </a:fillRef>
+          <a:effectRef idx="0">
+            <a:schemeClr val="accent1"/>
+          </a:effectRef>
+          <a:fontRef idx="minor">
+            <a:schemeClr val="tx1"/>
+          </a:fontRef>
+        </p:style>
+      </p:cxnSp>
+      <p:cxnSp>
+        <p:nvCxnSpPr>
+          <p:cNvPr id="29" name="Straight Arrow Connector 28"/>
+          <p:cNvCxnSpPr/>
+          <p:nvPr/>
+        </p:nvCxnSpPr>
+        <p:spPr>
+          <a:xfrm flipH="1">
+            <a:off x="6248400" y="3383993"/>
+            <a:ext cx="229704" cy="205026"/>
+          </a:xfrm>
+          <a:prstGeom prst="straightConnector1">
+            <a:avLst/>
+          </a:prstGeom>
+          <a:ln>
+            <a:tailEnd type="arrow"/>
+          </a:ln>
+        </p:spPr>
+        <p:style>
+          <a:lnRef idx="1">
+            <a:schemeClr val="accent1"/>
+          </a:lnRef>
+          <a:fillRef idx="0">
+            <a:schemeClr val="accent1"/>
+          </a:fillRef>
+          <a:effectRef idx="0">
+            <a:schemeClr val="accent1"/>
+          </a:effectRef>
+          <a:fontRef idx="minor">
+            <a:schemeClr val="tx1"/>
+          </a:fontRef>
+        </p:style>
+      </p:cxnSp>
+      <mc:AlternateContent xmlns:mc="http://schemas.openxmlformats.org/markup-compatibility/2006" xmlns:a14="http://schemas.microsoft.com/office/drawing/2010/main">
+        <mc:Choice Requires="a14">
+          <p:sp>
+            <p:nvSpPr>
+              <p:cNvPr id="31" name="TextBox 30"/>
+              <p:cNvSpPr txBox="1"/>
+              <p:nvPr/>
+            </p:nvSpPr>
+            <p:spPr>
+              <a:xfrm>
+                <a:off x="5408279" y="5638800"/>
+                <a:ext cx="2486963" cy="369332"/>
+              </a:xfrm>
+              <a:prstGeom prst="rect">
+                <a:avLst/>
+              </a:prstGeom>
+              <a:noFill/>
+            </p:spPr>
+            <p:txBody>
+              <a:bodyPr wrap="none" rtlCol="0">
+                <a:spAutoFit/>
+              </a:bodyPr>
+              <a:lstStyle/>
+              <a:p>
+                <a:r>
+                  <a:rPr lang="en-US" b="0" dirty="0" smtClean="0"/>
+                  <a:t>Restrict candidates to </a:t>
+                </a:r>
+                <a14:m>
+                  <m:oMath xmlns:m="http://schemas.openxmlformats.org/officeDocument/2006/math">
+                    <m:sSub>
+                      <m:sSubPr>
+                        <m:ctrlPr>
+                          <a:rPr lang="en-US" b="0" i="1" smtClean="0">
+                            <a:latin typeface="Cambria Math"/>
+                          </a:rPr>
+                        </m:ctrlPr>
+                      </m:sSubPr>
+                      <m:e>
+                        <m:r>
+                          <a:rPr lang="en-US" b="0" i="1" smtClean="0">
+                            <a:latin typeface="Cambria Math"/>
+                          </a:rPr>
+                          <m:t>𝑇</m:t>
+                        </m:r>
+                      </m:e>
+                      <m:sub>
+                        <m:r>
+                          <a:rPr lang="en-US" b="0" i="1" smtClean="0">
+                            <a:latin typeface="Cambria Math"/>
+                          </a:rPr>
+                          <m:t>𝑎</m:t>
+                        </m:r>
+                      </m:sub>
+                    </m:sSub>
+                  </m:oMath>
+                </a14:m>
+                <a:endParaRPr lang="en-US" b="0" dirty="0" smtClean="0"/>
+              </a:p>
+            </p:txBody>
+          </p:sp>
+        </mc:Choice>
+        <mc:Fallback xmlns="">
+          <p:sp>
+            <p:nvSpPr>
+              <p:cNvPr id="31" name="TextBox 30"/>
+              <p:cNvSpPr txBox="1">
+                <a:spLocks noRot="1" noChangeAspect="1" noMove="1" noResize="1" noEditPoints="1" noAdjustHandles="1" noChangeArrowheads="1" noChangeShapeType="1" noTextEdit="1"/>
+              </p:cNvSpPr>
+              <p:nvPr/>
+            </p:nvSpPr>
+            <p:spPr>
+              <a:xfrm>
+                <a:off x="5408279" y="5638800"/>
+                <a:ext cx="2486963" cy="369332"/>
+              </a:xfrm>
+              <a:prstGeom prst="rect">
+                <a:avLst/>
+              </a:prstGeom>
+              <a:blipFill rotWithShape="1">
+                <a:blip r:embed="rId7"/>
+                <a:stretch>
+                  <a:fillRect l="-1961" t="-8197" b="-24590"/>
+                </a:stretch>
+              </a:blipFill>
+            </p:spPr>
+            <p:txBody>
+              <a:bodyPr/>
+              <a:lstStyle/>
+              <a:p>
+                <a:r>
+                  <a:rPr lang="en-US">
+                    <a:noFill/>
+                  </a:rPr>
+                  <a:t> </a:t>
+                </a:r>
+              </a:p>
+            </p:txBody>
+          </p:sp>
+        </mc:Fallback>
+      </mc:AlternateContent>
     </p:spTree>
     <p:extLst>
       <p:ext uri="{BB962C8B-B14F-4D97-AF65-F5344CB8AC3E}">
         <p14:creationId xmlns:p14="http://schemas.microsoft.com/office/powerpoint/2010/main" val="463718320"/>
+      </p:ext>
+    </p:extLst>
+  </p:cSld>
+  <p:clrMapOvr>
+    <a:masterClrMapping/>
+  </p:clrMapOvr>
+  <p:timing>
+    <p:tnLst>
+      <p:par>
+        <p:cTn id="1" dur="indefinite" restart="never" nodeType="tmRoot">
+          <p:childTnLst>
+            <p:seq concurrent="1" nextAc="seek">
+              <p:cTn id="2" dur="indefinite" nodeType="mainSeq">
+                <p:childTnLst>
+                  <p:par>
+                    <p:cTn id="3" fill="hold">
+                      <p:stCondLst>
+                        <p:cond delay="indefinite"/>
+                      </p:stCondLst>
+                      <p:childTnLst>
+                        <p:par>
+                          <p:cTn id="4" fill="hold">
+                            <p:stCondLst>
+                              <p:cond delay="0"/>
+                            </p:stCondLst>
+                            <p:childTnLst>
+                              <p:par>
+                                <p:cTn id="5" presetID="1" presetClass="entr" presetSubtype="0" fill="hold" nodeType="clickEffect">
+                                  <p:stCondLst>
+                                    <p:cond delay="0"/>
+                                  </p:stCondLst>
+                                  <p:childTnLst>
+                                    <p:set>
+                                      <p:cBhvr>
+                                        <p:cTn id="6" dur="1" fill="hold">
+                                          <p:stCondLst>
+                                            <p:cond delay="0"/>
+                                          </p:stCondLst>
+                                        </p:cTn>
+                                        <p:tgtEl>
+                                          <p:spTgt spid="23"/>
+                                        </p:tgtEl>
+                                        <p:attrNameLst>
+                                          <p:attrName>style.visibility</p:attrName>
+                                        </p:attrNameLst>
+                                      </p:cBhvr>
+                                      <p:to>
+                                        <p:strVal val="visible"/>
+                                      </p:to>
+                                    </p:set>
+                                  </p:childTnLst>
+                                </p:cTn>
+                              </p:par>
+                              <p:par>
+                                <p:cTn id="7" presetID="1" presetClass="entr" presetSubtype="0" fill="hold" grpId="0" nodeType="withEffect">
+                                  <p:stCondLst>
+                                    <p:cond delay="0"/>
+                                  </p:stCondLst>
+                                  <p:childTnLst>
+                                    <p:set>
+                                      <p:cBhvr>
+                                        <p:cTn id="8" dur="1" fill="hold">
+                                          <p:stCondLst>
+                                            <p:cond delay="0"/>
+                                          </p:stCondLst>
+                                        </p:cTn>
+                                        <p:tgtEl>
+                                          <p:spTgt spid="31"/>
+                                        </p:tgtEl>
+                                        <p:attrNameLst>
+                                          <p:attrName>style.visibility</p:attrName>
+                                        </p:attrNameLst>
+                                      </p:cBhvr>
+                                      <p:to>
+                                        <p:strVal val="visible"/>
+                                      </p:to>
+                                    </p:set>
+                                  </p:childTnLst>
+                                </p:cTn>
+                              </p:par>
+                              <p:par>
+                                <p:cTn id="9" presetID="1" presetClass="entr" presetSubtype="0" fill="hold" nodeType="withEffect">
+                                  <p:stCondLst>
+                                    <p:cond delay="0"/>
+                                  </p:stCondLst>
+                                  <p:childTnLst>
+                                    <p:set>
+                                      <p:cBhvr>
+                                        <p:cTn id="10" dur="1" fill="hold">
+                                          <p:stCondLst>
+                                            <p:cond delay="0"/>
+                                          </p:stCondLst>
+                                        </p:cTn>
+                                        <p:tgtEl>
+                                          <p:spTgt spid="27"/>
+                                        </p:tgtEl>
+                                        <p:attrNameLst>
+                                          <p:attrName>style.visibility</p:attrName>
+                                        </p:attrNameLst>
+                                      </p:cBhvr>
+                                      <p:to>
+                                        <p:strVal val="visible"/>
+                                      </p:to>
+                                    </p:set>
+                                  </p:childTnLst>
+                                </p:cTn>
+                              </p:par>
+                              <p:par>
+                                <p:cTn id="11" presetID="1" presetClass="entr" presetSubtype="0" fill="hold" nodeType="withEffect">
+                                  <p:stCondLst>
+                                    <p:cond delay="0"/>
+                                  </p:stCondLst>
+                                  <p:childTnLst>
+                                    <p:set>
+                                      <p:cBhvr>
+                                        <p:cTn id="12" dur="1" fill="hold">
+                                          <p:stCondLst>
+                                            <p:cond delay="0"/>
+                                          </p:stCondLst>
+                                        </p:cTn>
+                                        <p:tgtEl>
+                                          <p:spTgt spid="25"/>
+                                        </p:tgtEl>
+                                        <p:attrNameLst>
+                                          <p:attrName>style.visibility</p:attrName>
+                                        </p:attrNameLst>
+                                      </p:cBhvr>
+                                      <p:to>
+                                        <p:strVal val="visible"/>
+                                      </p:to>
+                                    </p:set>
+                                  </p:childTnLst>
+                                </p:cTn>
+                              </p:par>
+                              <p:par>
+                                <p:cTn id="13" presetID="1" presetClass="entr" presetSubtype="0" fill="hold" nodeType="withEffect">
+                                  <p:stCondLst>
+                                    <p:cond delay="0"/>
+                                  </p:stCondLst>
+                                  <p:childTnLst>
+                                    <p:set>
+                                      <p:cBhvr>
+                                        <p:cTn id="14" dur="1" fill="hold">
+                                          <p:stCondLst>
+                                            <p:cond delay="0"/>
+                                          </p:stCondLst>
+                                        </p:cTn>
+                                        <p:tgtEl>
+                                          <p:spTgt spid="29"/>
+                                        </p:tgtEl>
+                                        <p:attrNameLst>
+                                          <p:attrName>style.visibility</p:attrName>
+                                        </p:attrNameLst>
+                                      </p:cBhvr>
+                                      <p:to>
+                                        <p:strVal val="visible"/>
+                                      </p:to>
+                                    </p:set>
+                                  </p:childTnLst>
+                                </p:cTn>
+                              </p:par>
+                              <p:par>
+                                <p:cTn id="15" presetID="1" presetClass="entr" presetSubtype="0" fill="hold" nodeType="withEffect">
+                                  <p:stCondLst>
+                                    <p:cond delay="0"/>
+                                  </p:stCondLst>
+                                  <p:childTnLst>
+                                    <p:set>
+                                      <p:cBhvr>
+                                        <p:cTn id="16" dur="1" fill="hold">
+                                          <p:stCondLst>
+                                            <p:cond delay="0"/>
+                                          </p:stCondLst>
+                                        </p:cTn>
+                                        <p:tgtEl>
+                                          <p:spTgt spid="24"/>
+                                        </p:tgtEl>
+                                        <p:attrNameLst>
+                                          <p:attrName>style.visibility</p:attrName>
+                                        </p:attrNameLst>
+                                      </p:cBhvr>
+                                      <p:to>
+                                        <p:strVal val="visible"/>
+                                      </p:to>
+                                    </p:set>
+                                  </p:childTnLst>
+                                </p:cTn>
+                              </p:par>
+                              <p:par>
+                                <p:cTn id="17" presetID="1" presetClass="entr" presetSubtype="0" fill="hold" nodeType="withEffect">
+                                  <p:stCondLst>
+                                    <p:cond delay="0"/>
+                                  </p:stCondLst>
+                                  <p:childTnLst>
+                                    <p:set>
+                                      <p:cBhvr>
+                                        <p:cTn id="18" dur="1" fill="hold">
+                                          <p:stCondLst>
+                                            <p:cond delay="0"/>
+                                          </p:stCondLst>
+                                        </p:cTn>
+                                        <p:tgtEl>
+                                          <p:spTgt spid="26"/>
+                                        </p:tgtEl>
+                                        <p:attrNameLst>
+                                          <p:attrName>style.visibility</p:attrName>
+                                        </p:attrNameLst>
+                                      </p:cBhvr>
+                                      <p:to>
+                                        <p:strVal val="visible"/>
+                                      </p:to>
+                                    </p:set>
+                                  </p:childTnLst>
+                                </p:cTn>
+                              </p:par>
+                              <p:par>
+                                <p:cTn id="19" presetID="1" presetClass="entr" presetSubtype="0" fill="hold" nodeType="withEffect">
+                                  <p:stCondLst>
+                                    <p:cond delay="0"/>
+                                  </p:stCondLst>
+                                  <p:childTnLst>
+                                    <p:set>
+                                      <p:cBhvr>
+                                        <p:cTn id="20" dur="1" fill="hold">
+                                          <p:stCondLst>
+                                            <p:cond delay="0"/>
+                                          </p:stCondLst>
+                                        </p:cTn>
+                                        <p:tgtEl>
+                                          <p:spTgt spid="28"/>
+                                        </p:tgtEl>
+                                        <p:attrNameLst>
+                                          <p:attrName>style.visibility</p:attrName>
+                                        </p:attrNameLst>
+                                      </p:cBhvr>
+                                      <p:to>
+                                        <p:strVal val="visible"/>
+                                      </p:to>
+                                    </p:set>
+                                  </p:childTnLst>
+                                </p:cTn>
+                              </p:par>
+                            </p:childTnLst>
+                          </p:cTn>
+                        </p:par>
+                      </p:childTnLst>
+                    </p:cTn>
+                  </p:par>
+                </p:childTnLst>
+              </p:cTn>
+              <p:prevCondLst>
+                <p:cond evt="onPrev" delay="0">
+                  <p:tgtEl>
+                    <p:sldTgt/>
+                  </p:tgtEl>
+                </p:cond>
+              </p:prevCondLst>
+              <p:nextCondLst>
+                <p:cond evt="onNext" delay="0">
+                  <p:tgtEl>
+                    <p:sldTgt/>
+                  </p:tgtEl>
+                </p:cond>
+              </p:nextCondLst>
+            </p:seq>
+          </p:childTnLst>
+        </p:cTn>
+      </p:par>
+    </p:tnLst>
+    <p:bldLst>
+      <p:bldP spid="31" grpId="0"/>
+    </p:bldLst>
+  </p:timing>
+</p:sld>
+</file>
+
+<file path=ppt/slides/slide17.xml><?xml version="1.0" encoding="utf-8"?>
+<p:sld xmlns:a="http://schemas.openxmlformats.org/drawingml/2006/main" xmlns:r="http://schemas.openxmlformats.org/officeDocument/2006/relationships" xmlns:p="http://schemas.openxmlformats.org/presentationml/2006/main">
+  <p:cSld>
+    <p:spTree>
+      <p:nvGrpSpPr>
+        <p:cNvPr id="1" name=""/>
+        <p:cNvGrpSpPr/>
+        <p:nvPr/>
+      </p:nvGrpSpPr>
+      <p:grpSpPr>
+        <a:xfrm>
+          <a:off x="0" y="0"/>
+          <a:ext cx="0" cy="0"/>
+          <a:chOff x="0" y="0"/>
+          <a:chExt cx="0" cy="0"/>
+        </a:xfrm>
+      </p:grpSpPr>
+      <p:pic>
+        <p:nvPicPr>
+          <p:cNvPr id="6" name="Picture 5"/>
+          <p:cNvPicPr>
+            <a:picLocks noChangeAspect="1"/>
+          </p:cNvPicPr>
+          <p:nvPr/>
+        </p:nvPicPr>
+        <p:blipFill>
+          <a:blip r:embed="rId2">
+            <a:extLst>
+              <a:ext uri="{28A0092B-C50C-407E-A947-70E740481C1C}">
+                <a14:useLocalDpi xmlns:a14="http://schemas.microsoft.com/office/drawing/2010/main" val="0"/>
+              </a:ext>
+            </a:extLst>
+          </a:blip>
+          <a:stretch>
+            <a:fillRect/>
+          </a:stretch>
+        </p:blipFill>
+        <p:spPr>
+          <a:xfrm>
+            <a:off x="1152952" y="709952"/>
+            <a:ext cx="6838096" cy="5438096"/>
+          </a:xfrm>
+          <a:prstGeom prst="rect">
+            <a:avLst/>
+          </a:prstGeom>
+        </p:spPr>
+      </p:pic>
+    </p:spTree>
+    <p:extLst>
+      <p:ext uri="{BB962C8B-B14F-4D97-AF65-F5344CB8AC3E}">
+        <p14:creationId xmlns:p14="http://schemas.microsoft.com/office/powerpoint/2010/main" val="1286396723"/>
       </p:ext>
     </p:extLst>
   </p:cSld>
@@ -5347,7 +7804,7 @@
 </p:sld>
 </file>
 
-<file path=ppt/slides/slide15.xml><?xml version="1.0" encoding="utf-8"?>
+<file path=ppt/slides/slide18.xml><?xml version="1.0" encoding="utf-8"?>
 <p:sld xmlns:a="http://schemas.openxmlformats.org/drawingml/2006/main" xmlns:r="http://schemas.openxmlformats.org/officeDocument/2006/relationships" xmlns:p="http://schemas.openxmlformats.org/presentationml/2006/main">
   <p:cSld>
     <p:spTree>
@@ -5364,10 +7821,40 @@
           <a:chExt cx="0" cy="0"/>
         </a:xfrm>
       </p:grpSpPr>
+      <p:pic>
+        <p:nvPicPr>
+          <p:cNvPr id="2" name="Picture 1"/>
+          <p:cNvPicPr>
+            <a:picLocks noChangeAspect="1"/>
+          </p:cNvPicPr>
+          <p:nvPr/>
+        </p:nvPicPr>
+        <p:blipFill>
+          <a:blip r:embed="rId2">
+            <a:extLst>
+              <a:ext uri="{28A0092B-C50C-407E-A947-70E740481C1C}">
+                <a14:useLocalDpi xmlns:a14="http://schemas.microsoft.com/office/drawing/2010/main" val="0"/>
+              </a:ext>
+            </a:extLst>
+          </a:blip>
+          <a:stretch>
+            <a:fillRect/>
+          </a:stretch>
+        </p:blipFill>
+        <p:spPr>
+          <a:xfrm>
+            <a:off x="1152952" y="709952"/>
+            <a:ext cx="6838096" cy="5438096"/>
+          </a:xfrm>
+          <a:prstGeom prst="rect">
+            <a:avLst/>
+          </a:prstGeom>
+        </p:spPr>
+      </p:pic>
     </p:spTree>
     <p:extLst>
       <p:ext uri="{BB962C8B-B14F-4D97-AF65-F5344CB8AC3E}">
-        <p14:creationId xmlns:p14="http://schemas.microsoft.com/office/powerpoint/2010/main" val="1286396723"/>
+        <p14:creationId xmlns:p14="http://schemas.microsoft.com/office/powerpoint/2010/main" val="2384657190"/>
       </p:ext>
     </p:extLst>
   </p:cSld>
@@ -5380,6 +7867,573 @@
         <p:cTn id="1" dur="indefinite" restart="never" nodeType="tmRoot"/>
       </p:par>
     </p:tnLst>
+  </p:timing>
+</p:sld>
+</file>
+
+<file path=ppt/slides/slide19.xml><?xml version="1.0" encoding="utf-8"?>
+<p:sld xmlns:a="http://schemas.openxmlformats.org/drawingml/2006/main" xmlns:r="http://schemas.openxmlformats.org/officeDocument/2006/relationships" xmlns:p="http://schemas.openxmlformats.org/presentationml/2006/main">
+  <p:cSld>
+    <p:spTree>
+      <p:nvGrpSpPr>
+        <p:cNvPr id="1" name=""/>
+        <p:cNvGrpSpPr/>
+        <p:nvPr/>
+      </p:nvGrpSpPr>
+      <p:grpSpPr>
+        <a:xfrm>
+          <a:off x="0" y="0"/>
+          <a:ext cx="0" cy="0"/>
+          <a:chOff x="0" y="0"/>
+          <a:chExt cx="0" cy="0"/>
+        </a:xfrm>
+      </p:grpSpPr>
+      <p:sp>
+        <p:nvSpPr>
+          <p:cNvPr id="2" name="Title 1"/>
+          <p:cNvSpPr>
+            <a:spLocks noGrp="1"/>
+          </p:cNvSpPr>
+          <p:nvPr>
+            <p:ph type="title"/>
+          </p:nvPr>
+        </p:nvSpPr>
+        <p:spPr/>
+        <p:txBody>
+          <a:bodyPr/>
+          <a:lstStyle/>
+          <a:p>
+            <a:r>
+              <a:rPr lang="en-US" dirty="0" smtClean="0"/>
+              <a:t>Other </a:t>
+            </a:r>
+            <a:r>
+              <a:rPr lang="en-US" dirty="0" smtClean="0"/>
+              <a:t>challenges</a:t>
+            </a:r>
+            <a:endParaRPr lang="en-US" dirty="0"/>
+          </a:p>
+        </p:txBody>
+      </p:sp>
+      <p:pic>
+        <p:nvPicPr>
+          <p:cNvPr id="7170" name="Picture 2"/>
+          <p:cNvPicPr>
+            <a:picLocks noChangeAspect="1" noChangeArrowheads="1"/>
+          </p:cNvPicPr>
+          <p:nvPr/>
+        </p:nvPicPr>
+        <p:blipFill>
+          <a:blip r:embed="rId2">
+            <a:extLst>
+              <a:ext uri="{28A0092B-C50C-407E-A947-70E740481C1C}">
+                <a14:useLocalDpi xmlns:a14="http://schemas.microsoft.com/office/drawing/2010/main" val="0"/>
+              </a:ext>
+            </a:extLst>
+          </a:blip>
+          <a:srcRect/>
+          <a:stretch>
+            <a:fillRect/>
+          </a:stretch>
+        </p:blipFill>
+        <p:spPr bwMode="auto">
+          <a:xfrm>
+            <a:off x="1504472" y="1905000"/>
+            <a:ext cx="6040437" cy="895350"/>
+          </a:xfrm>
+          <a:prstGeom prst="rect">
+            <a:avLst/>
+          </a:prstGeom>
+          <a:noFill/>
+          <a:ln>
+            <a:noFill/>
+          </a:ln>
+          <a:effectLst/>
+          <a:extLst>
+            <a:ext uri="{909E8E84-426E-40DD-AFC4-6F175D3DCCD1}">
+              <a14:hiddenFill xmlns:a14="http://schemas.microsoft.com/office/drawing/2010/main">
+                <a:solidFill>
+                  <a:schemeClr val="accent1"/>
+                </a:solidFill>
+              </a14:hiddenFill>
+            </a:ext>
+            <a:ext uri="{91240B29-F687-4F45-9708-019B960494DF}">
+              <a14:hiddenLine xmlns:a14="http://schemas.microsoft.com/office/drawing/2010/main" w="9525">
+                <a:solidFill>
+                  <a:schemeClr val="tx1"/>
+                </a:solidFill>
+                <a:miter lim="800000"/>
+                <a:headEnd/>
+                <a:tailEnd/>
+              </a14:hiddenLine>
+            </a:ext>
+            <a:ext uri="{AF507438-7753-43E0-B8FC-AC1667EBCBE1}">
+              <a14:hiddenEffects xmlns:a14="http://schemas.microsoft.com/office/drawing/2010/main">
+                <a:effectLst>
+                  <a:outerShdw dist="35921" dir="2700000" algn="ctr" rotWithShape="0">
+                    <a:schemeClr val="bg2"/>
+                  </a:outerShdw>
+                </a:effectLst>
+              </a14:hiddenEffects>
+            </a:ext>
+          </a:extLst>
+        </p:spPr>
+      </p:pic>
+      <p:cxnSp>
+        <p:nvCxnSpPr>
+          <p:cNvPr id="5" name="Straight Arrow Connector 4"/>
+          <p:cNvCxnSpPr>
+            <a:stCxn id="6" idx="1"/>
+            <a:endCxn id="7170" idx="3"/>
+          </p:cNvCxnSpPr>
+          <p:nvPr/>
+        </p:nvCxnSpPr>
+        <p:spPr>
+          <a:xfrm flipH="1">
+            <a:off x="7544909" y="2228166"/>
+            <a:ext cx="456091" cy="124509"/>
+          </a:xfrm>
+          <a:prstGeom prst="straightConnector1">
+            <a:avLst/>
+          </a:prstGeom>
+          <a:ln>
+            <a:tailEnd type="arrow"/>
+          </a:ln>
+        </p:spPr>
+        <p:style>
+          <a:lnRef idx="1">
+            <a:schemeClr val="accent1"/>
+          </a:lnRef>
+          <a:fillRef idx="0">
+            <a:schemeClr val="accent1"/>
+          </a:fillRef>
+          <a:effectRef idx="0">
+            <a:schemeClr val="accent1"/>
+          </a:effectRef>
+          <a:fontRef idx="minor">
+            <a:schemeClr val="tx1"/>
+          </a:fontRef>
+        </p:style>
+      </p:cxnSp>
+      <p:sp>
+        <p:nvSpPr>
+          <p:cNvPr id="6" name="TextBox 5"/>
+          <p:cNvSpPr txBox="1"/>
+          <p:nvPr/>
+        </p:nvSpPr>
+        <p:spPr>
+          <a:xfrm>
+            <a:off x="8001000" y="1905000"/>
+            <a:ext cx="978153" cy="646331"/>
+          </a:xfrm>
+          <a:prstGeom prst="rect">
+            <a:avLst/>
+          </a:prstGeom>
+          <a:noFill/>
+        </p:spPr>
+        <p:txBody>
+          <a:bodyPr wrap="none" rtlCol="0">
+            <a:spAutoFit/>
+          </a:bodyPr>
+          <a:lstStyle/>
+          <a:p>
+            <a:r>
+              <a:rPr lang="en-US" dirty="0" smtClean="0">
+                <a:latin typeface="Calibri Light" panose="020F0302020204030204" pitchFamily="34" charset="0"/>
+              </a:rPr>
+              <a:t>Why is </a:t>
+            </a:r>
+          </a:p>
+          <a:p>
+            <a:r>
+              <a:rPr lang="en-US" dirty="0">
+                <a:latin typeface="Calibri Light" panose="020F0302020204030204" pitchFamily="34" charset="0"/>
+              </a:rPr>
+              <a:t>t</a:t>
+            </a:r>
+            <a:r>
+              <a:rPr lang="en-US" dirty="0" smtClean="0">
+                <a:latin typeface="Calibri Light" panose="020F0302020204030204" pitchFamily="34" charset="0"/>
+              </a:rPr>
+              <a:t>his 1.0?</a:t>
+            </a:r>
+            <a:endParaRPr lang="en-US" dirty="0">
+              <a:latin typeface="Calibri Light" panose="020F0302020204030204" pitchFamily="34" charset="0"/>
+            </a:endParaRPr>
+          </a:p>
+        </p:txBody>
+      </p:sp>
+      <mc:AlternateContent xmlns:mc="http://schemas.openxmlformats.org/markup-compatibility/2006">
+        <mc:Choice xmlns:a14="http://schemas.microsoft.com/office/drawing/2010/main" Requires="a14">
+          <p:sp>
+            <p:nvSpPr>
+              <p:cNvPr id="15" name="TextBox 14"/>
+              <p:cNvSpPr txBox="1"/>
+              <p:nvPr/>
+            </p:nvSpPr>
+            <p:spPr>
+              <a:xfrm>
+                <a:off x="1821993" y="3470476"/>
+                <a:ext cx="5405391" cy="369332"/>
+              </a:xfrm>
+              <a:prstGeom prst="rect">
+                <a:avLst/>
+              </a:prstGeom>
+              <a:noFill/>
+            </p:spPr>
+            <p:txBody>
+              <a:bodyPr wrap="none" rtlCol="0">
+                <a:spAutoFit/>
+              </a:bodyPr>
+              <a:lstStyle/>
+              <a:p>
+                <a:r>
+                  <a:rPr lang="en-US" dirty="0" smtClean="0">
+                    <a:latin typeface="Adobe Fan Heiti Std B" pitchFamily="34" charset="-128"/>
+                    <a:ea typeface="Adobe Fan Heiti Std B" pitchFamily="34" charset="-128"/>
+                  </a:rPr>
+                  <a:t>How do you compute  </a:t>
+                </a:r>
+                <a14:m>
+                  <m:oMath xmlns:m="http://schemas.openxmlformats.org/officeDocument/2006/math">
+                    <m:sSub>
+                      <m:sSubPr>
+                        <m:ctrlPr>
+                          <a:rPr lang="en-US" b="0" i="1" smtClean="0">
+                            <a:latin typeface="Cambria Math"/>
+                          </a:rPr>
+                        </m:ctrlPr>
+                      </m:sSubPr>
+                      <m:e>
+                        <m:r>
+                          <a:rPr lang="en-US" b="0" i="1" smtClean="0">
+                            <a:latin typeface="Cambria Math"/>
+                          </a:rPr>
+                          <m:t>𝑇</m:t>
+                        </m:r>
+                      </m:e>
+                      <m:sub>
+                        <m:r>
+                          <a:rPr lang="en-US" b="0" i="1" smtClean="0">
+                            <a:latin typeface="Cambria Math"/>
+                          </a:rPr>
+                          <m:t>𝑎</m:t>
+                        </m:r>
+                      </m:sub>
+                    </m:sSub>
+                    <m:r>
+                      <a:rPr lang="en-US" b="0" i="1" smtClean="0">
+                        <a:latin typeface="Cambria Math"/>
+                      </a:rPr>
+                      <m:t> </m:t>
+                    </m:r>
+                  </m:oMath>
+                </a14:m>
+                <a:r>
+                  <a:rPr lang="en-US" dirty="0" smtClean="0">
+                    <a:latin typeface="Adobe Fan Heiti Std B" pitchFamily="34" charset="-128"/>
+                    <a:ea typeface="Adobe Fan Heiti Std B" pitchFamily="34" charset="-128"/>
+                  </a:rPr>
+                  <a:t>for non-tree-like graphs?</a:t>
+                </a:r>
+                <a:endParaRPr lang="en-US" dirty="0">
+                  <a:latin typeface="Adobe Fan Heiti Std B" pitchFamily="34" charset="-128"/>
+                  <a:ea typeface="Adobe Fan Heiti Std B" pitchFamily="34" charset="-128"/>
+                </a:endParaRPr>
+              </a:p>
+            </p:txBody>
+          </p:sp>
+        </mc:Choice>
+        <mc:Fallback>
+          <p:sp>
+            <p:nvSpPr>
+              <p:cNvPr id="15" name="TextBox 14"/>
+              <p:cNvSpPr txBox="1">
+                <a:spLocks noRot="1" noChangeAspect="1" noMove="1" noResize="1" noEditPoints="1" noAdjustHandles="1" noChangeArrowheads="1" noChangeShapeType="1" noTextEdit="1"/>
+              </p:cNvSpPr>
+              <p:nvPr/>
+            </p:nvSpPr>
+            <p:spPr>
+              <a:xfrm>
+                <a:off x="1821993" y="3470476"/>
+                <a:ext cx="5405391" cy="369332"/>
+              </a:xfrm>
+              <a:prstGeom prst="rect">
+                <a:avLst/>
+              </a:prstGeom>
+              <a:blipFill rotWithShape="1">
+                <a:blip r:embed="rId3"/>
+                <a:stretch>
+                  <a:fillRect l="-1015" t="-6557" b="-26230"/>
+                </a:stretch>
+              </a:blipFill>
+            </p:spPr>
+            <p:txBody>
+              <a:bodyPr/>
+              <a:lstStyle/>
+              <a:p>
+                <a:r>
+                  <a:rPr lang="en-US">
+                    <a:noFill/>
+                  </a:rPr>
+                  <a:t> </a:t>
+                </a:r>
+              </a:p>
+            </p:txBody>
+          </p:sp>
+        </mc:Fallback>
+      </mc:AlternateContent>
+      <p:sp>
+        <p:nvSpPr>
+          <p:cNvPr id="7" name="TextBox 6"/>
+          <p:cNvSpPr txBox="1"/>
+          <p:nvPr/>
+        </p:nvSpPr>
+        <p:spPr>
+          <a:xfrm>
+            <a:off x="1931671" y="4507468"/>
+            <a:ext cx="5186035" cy="369332"/>
+          </a:xfrm>
+          <a:prstGeom prst="rect">
+            <a:avLst/>
+          </a:prstGeom>
+          <a:noFill/>
+        </p:spPr>
+        <p:txBody>
+          <a:bodyPr wrap="none" rtlCol="0">
+            <a:spAutoFit/>
+          </a:bodyPr>
+          <a:lstStyle/>
+          <a:p>
+            <a:r>
+              <a:rPr lang="en-US" dirty="0" smtClean="0">
+                <a:latin typeface="Adobe Fan Heiti Std B" pitchFamily="34" charset="-128"/>
+                <a:ea typeface="Adobe Fan Heiti Std B" pitchFamily="34" charset="-128"/>
+              </a:rPr>
+              <a:t>What parameters do we use to replicate results?</a:t>
+            </a:r>
+            <a:endParaRPr lang="en-US" dirty="0">
+              <a:latin typeface="Adobe Fan Heiti Std B" pitchFamily="34" charset="-128"/>
+              <a:ea typeface="Adobe Fan Heiti Std B" pitchFamily="34" charset="-128"/>
+            </a:endParaRPr>
+          </a:p>
+        </p:txBody>
+      </p:sp>
+      <p:sp>
+        <p:nvSpPr>
+          <p:cNvPr id="8" name="TextBox 7"/>
+          <p:cNvSpPr txBox="1"/>
+          <p:nvPr/>
+        </p:nvSpPr>
+        <p:spPr>
+          <a:xfrm>
+            <a:off x="1611871" y="5791200"/>
+            <a:ext cx="5825634" cy="369332"/>
+          </a:xfrm>
+          <a:prstGeom prst="rect">
+            <a:avLst/>
+          </a:prstGeom>
+          <a:noFill/>
+        </p:spPr>
+        <p:txBody>
+          <a:bodyPr wrap="none" rtlCol="0">
+            <a:spAutoFit/>
+          </a:bodyPr>
+          <a:lstStyle/>
+          <a:p>
+            <a:r>
+              <a:rPr lang="en-US" dirty="0" smtClean="0">
+                <a:latin typeface="Adobe Fan Heiti Std B" pitchFamily="34" charset="-128"/>
+                <a:ea typeface="Adobe Fan Heiti Std B" pitchFamily="34" charset="-128"/>
+              </a:rPr>
+              <a:t>Now that Secret is dead, does any of this even matter?</a:t>
+            </a:r>
+            <a:endParaRPr lang="en-US" dirty="0">
+              <a:latin typeface="Adobe Fan Heiti Std B" pitchFamily="34" charset="-128"/>
+              <a:ea typeface="Adobe Fan Heiti Std B" pitchFamily="34" charset="-128"/>
+            </a:endParaRPr>
+          </a:p>
+        </p:txBody>
+      </p:sp>
+    </p:spTree>
+    <p:extLst>
+      <p:ext uri="{BB962C8B-B14F-4D97-AF65-F5344CB8AC3E}">
+        <p14:creationId xmlns:p14="http://schemas.microsoft.com/office/powerpoint/2010/main" val="2430588940"/>
+      </p:ext>
+    </p:extLst>
+  </p:cSld>
+  <p:clrMapOvr>
+    <a:masterClrMapping/>
+  </p:clrMapOvr>
+  <p:timing>
+    <p:tnLst>
+      <p:par>
+        <p:cTn id="1" dur="indefinite" restart="never" nodeType="tmRoot">
+          <p:childTnLst>
+            <p:seq concurrent="1" nextAc="seek">
+              <p:cTn id="2" dur="indefinite" nodeType="mainSeq">
+                <p:childTnLst>
+                  <p:par>
+                    <p:cTn id="3" fill="hold">
+                      <p:stCondLst>
+                        <p:cond delay="indefinite"/>
+                      </p:stCondLst>
+                      <p:childTnLst>
+                        <p:par>
+                          <p:cTn id="4" fill="hold">
+                            <p:stCondLst>
+                              <p:cond delay="0"/>
+                            </p:stCondLst>
+                            <p:childTnLst>
+                              <p:par>
+                                <p:cTn id="5" presetID="1" presetClass="entr" presetSubtype="0" fill="hold" grpId="0" nodeType="clickEffect">
+                                  <p:stCondLst>
+                                    <p:cond delay="0"/>
+                                  </p:stCondLst>
+                                  <p:childTnLst>
+                                    <p:set>
+                                      <p:cBhvr>
+                                        <p:cTn id="6" dur="1" fill="hold">
+                                          <p:stCondLst>
+                                            <p:cond delay="0"/>
+                                          </p:stCondLst>
+                                        </p:cTn>
+                                        <p:tgtEl>
+                                          <p:spTgt spid="15"/>
+                                        </p:tgtEl>
+                                        <p:attrNameLst>
+                                          <p:attrName>style.visibility</p:attrName>
+                                        </p:attrNameLst>
+                                      </p:cBhvr>
+                                      <p:to>
+                                        <p:strVal val="visible"/>
+                                      </p:to>
+                                    </p:set>
+                                  </p:childTnLst>
+                                </p:cTn>
+                              </p:par>
+                            </p:childTnLst>
+                          </p:cTn>
+                        </p:par>
+                      </p:childTnLst>
+                    </p:cTn>
+                  </p:par>
+                  <p:par>
+                    <p:cTn id="7" fill="hold">
+                      <p:stCondLst>
+                        <p:cond delay="indefinite"/>
+                      </p:stCondLst>
+                      <p:childTnLst>
+                        <p:par>
+                          <p:cTn id="8" fill="hold">
+                            <p:stCondLst>
+                              <p:cond delay="0"/>
+                            </p:stCondLst>
+                            <p:childTnLst>
+                              <p:par>
+                                <p:cTn id="9" presetID="1" presetClass="entr" presetSubtype="0" fill="hold" grpId="0" nodeType="clickEffect">
+                                  <p:stCondLst>
+                                    <p:cond delay="0"/>
+                                  </p:stCondLst>
+                                  <p:childTnLst>
+                                    <p:set>
+                                      <p:cBhvr>
+                                        <p:cTn id="10" dur="1" fill="hold">
+                                          <p:stCondLst>
+                                            <p:cond delay="0"/>
+                                          </p:stCondLst>
+                                        </p:cTn>
+                                        <p:tgtEl>
+                                          <p:spTgt spid="7"/>
+                                        </p:tgtEl>
+                                        <p:attrNameLst>
+                                          <p:attrName>style.visibility</p:attrName>
+                                        </p:attrNameLst>
+                                      </p:cBhvr>
+                                      <p:to>
+                                        <p:strVal val="visible"/>
+                                      </p:to>
+                                    </p:set>
+                                  </p:childTnLst>
+                                </p:cTn>
+                              </p:par>
+                            </p:childTnLst>
+                          </p:cTn>
+                        </p:par>
+                      </p:childTnLst>
+                    </p:cTn>
+                  </p:par>
+                  <p:par>
+                    <p:cTn id="11" fill="hold">
+                      <p:stCondLst>
+                        <p:cond delay="indefinite"/>
+                      </p:stCondLst>
+                      <p:childTnLst>
+                        <p:par>
+                          <p:cTn id="12" fill="hold">
+                            <p:stCondLst>
+                              <p:cond delay="0"/>
+                            </p:stCondLst>
+                            <p:childTnLst>
+                              <p:par>
+                                <p:cTn id="13" presetID="1" presetClass="entr" presetSubtype="0" fill="hold" grpId="0" nodeType="clickEffect">
+                                  <p:stCondLst>
+                                    <p:cond delay="0"/>
+                                  </p:stCondLst>
+                                  <p:childTnLst>
+                                    <p:set>
+                                      <p:cBhvr>
+                                        <p:cTn id="14" dur="1" fill="hold">
+                                          <p:stCondLst>
+                                            <p:cond delay="0"/>
+                                          </p:stCondLst>
+                                        </p:cTn>
+                                        <p:tgtEl>
+                                          <p:spTgt spid="8"/>
+                                        </p:tgtEl>
+                                        <p:attrNameLst>
+                                          <p:attrName>style.visibility</p:attrName>
+                                        </p:attrNameLst>
+                                      </p:cBhvr>
+                                      <p:to>
+                                        <p:strVal val="visible"/>
+                                      </p:to>
+                                    </p:set>
+                                  </p:childTnLst>
+                                </p:cTn>
+                              </p:par>
+                            </p:childTnLst>
+                          </p:cTn>
+                        </p:par>
+                      </p:childTnLst>
+                    </p:cTn>
+                  </p:par>
+                </p:childTnLst>
+              </p:cTn>
+              <p:prevCondLst>
+                <p:cond evt="onPrev" delay="0">
+                  <p:tgtEl>
+                    <p:sldTgt/>
+                  </p:tgtEl>
+                </p:cond>
+              </p:prevCondLst>
+              <p:nextCondLst>
+                <p:cond evt="onNext" delay="0">
+                  <p:tgtEl>
+                    <p:sldTgt/>
+                  </p:tgtEl>
+                </p:cond>
+              </p:nextCondLst>
+            </p:seq>
+          </p:childTnLst>
+        </p:cTn>
+      </p:par>
+    </p:tnLst>
+    <p:bldLst>
+      <p:bldP spid="15" grpId="0"/>
+      <p:bldP spid="7" grpId="0"/>
+      <p:bldP spid="8" grpId="0"/>
+    </p:bldLst>
   </p:timing>
 </p:sld>
 </file>
@@ -5789,6 +8843,123 @@
 </p:sld>
 </file>
 
+<file path=ppt/slides/slide20.xml><?xml version="1.0" encoding="utf-8"?>
+<p:sld xmlns:a="http://schemas.openxmlformats.org/drawingml/2006/main" xmlns:r="http://schemas.openxmlformats.org/officeDocument/2006/relationships" xmlns:p="http://schemas.openxmlformats.org/presentationml/2006/main">
+  <p:cSld>
+    <p:spTree>
+      <p:nvGrpSpPr>
+        <p:cNvPr id="1" name=""/>
+        <p:cNvGrpSpPr/>
+        <p:nvPr/>
+      </p:nvGrpSpPr>
+      <p:grpSpPr>
+        <a:xfrm>
+          <a:off x="0" y="0"/>
+          <a:ext cx="0" cy="0"/>
+          <a:chOff x="0" y="0"/>
+          <a:chExt cx="0" cy="0"/>
+        </a:xfrm>
+      </p:grpSpPr>
+      <p:sp>
+        <p:nvSpPr>
+          <p:cNvPr id="2" name="Title 1"/>
+          <p:cNvSpPr>
+            <a:spLocks noGrp="1"/>
+          </p:cNvSpPr>
+          <p:nvPr>
+            <p:ph type="title"/>
+          </p:nvPr>
+        </p:nvSpPr>
+        <p:spPr/>
+        <p:txBody>
+          <a:bodyPr/>
+          <a:lstStyle/>
+          <a:p>
+            <a:r>
+              <a:rPr lang="en-US" dirty="0" smtClean="0"/>
+              <a:t>Moving forward</a:t>
+            </a:r>
+            <a:endParaRPr lang="en-US" dirty="0"/>
+          </a:p>
+        </p:txBody>
+      </p:sp>
+      <p:sp>
+        <p:nvSpPr>
+          <p:cNvPr id="3" name="Content Placeholder 2"/>
+          <p:cNvSpPr>
+            <a:spLocks noGrp="1"/>
+          </p:cNvSpPr>
+          <p:nvPr>
+            <p:ph idx="1"/>
+          </p:nvPr>
+        </p:nvSpPr>
+        <p:spPr/>
+        <p:txBody>
+          <a:bodyPr/>
+          <a:lstStyle/>
+          <a:p>
+            <a:r>
+              <a:rPr lang="en-US" dirty="0" smtClean="0"/>
+              <a:t>Understand why the “ML” estimator is performing worse than </a:t>
+            </a:r>
+            <a:r>
+              <a:rPr lang="en-US" dirty="0" smtClean="0"/>
+              <a:t>“first spy” estimator</a:t>
+            </a:r>
+          </a:p>
+          <a:p>
+            <a:endParaRPr lang="en-US" dirty="0"/>
+          </a:p>
+          <a:p>
+            <a:r>
+              <a:rPr lang="en-US" dirty="0" smtClean="0"/>
+              <a:t>Replicate the results in Pinto </a:t>
+            </a:r>
+            <a:r>
+              <a:rPr lang="en-US" i="1" dirty="0" smtClean="0"/>
+              <a:t>et al</a:t>
+            </a:r>
+            <a:r>
+              <a:rPr lang="en-US" dirty="0" smtClean="0"/>
+              <a:t>. </a:t>
+            </a:r>
+            <a:r>
+              <a:rPr lang="en-US" dirty="0" smtClean="0"/>
+              <a:t>paper?</a:t>
+            </a:r>
+          </a:p>
+          <a:p>
+            <a:endParaRPr lang="en-US" dirty="0"/>
+          </a:p>
+          <a:p>
+            <a:r>
+              <a:rPr lang="en-US" dirty="0" smtClean="0"/>
+              <a:t>Study the parameter space in more detail</a:t>
+            </a:r>
+            <a:endParaRPr lang="en-US" dirty="0"/>
+          </a:p>
+        </p:txBody>
+      </p:sp>
+    </p:spTree>
+    <p:extLst>
+      <p:ext uri="{BB962C8B-B14F-4D97-AF65-F5344CB8AC3E}">
+        <p14:creationId xmlns:p14="http://schemas.microsoft.com/office/powerpoint/2010/main" val="406169848"/>
+      </p:ext>
+    </p:extLst>
+  </p:cSld>
+  <p:clrMapOvr>
+    <a:masterClrMapping/>
+  </p:clrMapOvr>
+  <p:timing>
+    <p:tnLst>
+      <p:par>
+        <p:cTn id="1" dur="indefinite" restart="never" nodeType="tmRoot"/>
+      </p:par>
+    </p:tnLst>
+  </p:timing>
+</p:sld>
+</file>
+
 <file path=ppt/slides/slide3.xml><?xml version="1.0" encoding="utf-8"?>
 <p:sld xmlns:a="http://schemas.openxmlformats.org/drawingml/2006/main" xmlns:r="http://schemas.openxmlformats.org/officeDocument/2006/relationships" xmlns:p="http://schemas.openxmlformats.org/presentationml/2006/main">
   <p:cSld>
@@ -6035,7 +9206,7 @@
       </p:sp>
       <p:pic>
         <p:nvPicPr>
-          <p:cNvPr id="4100" name="Picture 4" descr="https://fortunedotcom.files.wordpress.com/2014/08/secretcap2.jpg?quality=80&amp;w=1019"/>
+          <p:cNvPr id="10242" name="Picture 2"/>
           <p:cNvPicPr>
             <a:picLocks noChangeAspect="1" noChangeArrowheads="1"/>
           </p:cNvPicPr>
@@ -6056,20 +9227,82 @@
         </p:blipFill>
         <p:spPr bwMode="auto">
           <a:xfrm>
-            <a:off x="609600" y="2020272"/>
-            <a:ext cx="7620000" cy="4097900"/>
+            <a:off x="3071813" y="1752600"/>
+            <a:ext cx="3000375" cy="2514600"/>
           </a:xfrm>
           <a:prstGeom prst="rect">
             <a:avLst/>
           </a:prstGeom>
           <a:noFill/>
+          <a:ln w="9525">
+            <a:solidFill>
+              <a:schemeClr val="tx1"/>
+            </a:solidFill>
+            <a:miter lim="800000"/>
+            <a:headEnd/>
+            <a:tailEnd/>
+          </a:ln>
           <a:extLst>
             <a:ext uri="{909E8E84-426E-40DD-AFC4-6F175D3DCCD1}">
               <a14:hiddenFill xmlns:a14="http://schemas.microsoft.com/office/drawing/2010/main">
                 <a:solidFill>
-                  <a:srgbClr val="FFFFFF"/>
+                  <a:schemeClr val="accent1"/>
                 </a:solidFill>
               </a14:hiddenFill>
+            </a:ext>
+          </a:extLst>
+        </p:spPr>
+      </p:pic>
+      <p:pic>
+        <p:nvPicPr>
+          <p:cNvPr id="10243" name="Picture 3"/>
+          <p:cNvPicPr>
+            <a:picLocks noChangeAspect="1" noChangeArrowheads="1"/>
+          </p:cNvPicPr>
+          <p:nvPr/>
+        </p:nvPicPr>
+        <p:blipFill>
+          <a:blip r:embed="rId3">
+            <a:extLst>
+              <a:ext uri="{28A0092B-C50C-407E-A947-70E740481C1C}">
+                <a14:useLocalDpi xmlns:a14="http://schemas.microsoft.com/office/drawing/2010/main" val="0"/>
+              </a:ext>
+            </a:extLst>
+          </a:blip>
+          <a:srcRect/>
+          <a:stretch>
+            <a:fillRect/>
+          </a:stretch>
+        </p:blipFill>
+        <p:spPr bwMode="auto">
+          <a:xfrm>
+            <a:off x="1557337" y="3429000"/>
+            <a:ext cx="6029325" cy="2933700"/>
+          </a:xfrm>
+          <a:prstGeom prst="rect">
+            <a:avLst/>
+          </a:prstGeom>
+          <a:noFill/>
+          <a:ln>
+            <a:noFill/>
+          </a:ln>
+          <a:extLst>
+            <a:ext uri="{909E8E84-426E-40DD-AFC4-6F175D3DCCD1}">
+              <a14:hiddenFill xmlns:a14="http://schemas.microsoft.com/office/drawing/2010/main">
+                <a:solidFill>
+                  <a:schemeClr val="accent1"/>
+                </a:solidFill>
+              </a14:hiddenFill>
+            </a:ext>
+            <a:ext uri="{91240B29-F687-4F45-9708-019B960494DF}">
+              <a14:hiddenLine xmlns:a14="http://schemas.microsoft.com/office/drawing/2010/main" w="9525">
+                <a:solidFill>
+                  <a:schemeClr val="tx1"/>
+                </a:solidFill>
+                <a:miter lim="800000"/>
+                <a:headEnd/>
+                <a:tailEnd/>
+              </a14:hiddenLine>
             </a:ext>
           </a:extLst>
         </p:spPr>
@@ -6087,7 +9320,75 @@
   <p:timing>
     <p:tnLst>
       <p:par>
-        <p:cTn id="1" dur="indefinite" restart="never" nodeType="tmRoot"/>
+        <p:cTn id="1" dur="indefinite" restart="never" nodeType="tmRoot">
+          <p:childTnLst>
+            <p:seq concurrent="1" nextAc="seek">
+              <p:cTn id="2" dur="indefinite" nodeType="mainSeq">
+                <p:childTnLst>
+                  <p:par>
+                    <p:cTn id="3" fill="hold">
+                      <p:stCondLst>
+                        <p:cond delay="indefinite"/>
+                      </p:stCondLst>
+                      <p:childTnLst>
+                        <p:par>
+                          <p:cTn id="4" fill="hold">
+                            <p:stCondLst>
+                              <p:cond delay="0"/>
+                            </p:stCondLst>
+                            <p:childTnLst>
+                              <p:par>
+                                <p:cTn id="5" presetID="1" presetClass="entr" presetSubtype="0" fill="hold" nodeType="clickEffect">
+                                  <p:stCondLst>
+                                    <p:cond delay="0"/>
+                                  </p:stCondLst>
+                                  <p:childTnLst>
+                                    <p:set>
+                                      <p:cBhvr>
+                                        <p:cTn id="6" dur="1" fill="hold">
+                                          <p:stCondLst>
+                                            <p:cond delay="0"/>
+                                          </p:stCondLst>
+                                        </p:cTn>
+                                        <p:tgtEl>
+                                          <p:spTgt spid="10243"/>
+                                        </p:tgtEl>
+                                        <p:attrNameLst>
+                                          <p:attrName>style.visibility</p:attrName>
+                                        </p:attrNameLst>
+                                      </p:cBhvr>
+                                      <p:to>
+                                        <p:strVal val="visible"/>
+                                      </p:to>
+                                    </p:set>
+                                  </p:childTnLst>
+                                </p:cTn>
+                              </p:par>
+                            </p:childTnLst>
+                          </p:cTn>
+                        </p:par>
+                      </p:childTnLst>
+                    </p:cTn>
+                  </p:par>
+                </p:childTnLst>
+              </p:cTn>
+              <p:prevCondLst>
+                <p:cond evt="onPrev" delay="0">
+                  <p:tgtEl>
+                    <p:sldTgt/>
+                  </p:tgtEl>
+                </p:cond>
+              </p:prevCondLst>
+              <p:nextCondLst>
+                <p:cond evt="onNext" delay="0">
+                  <p:tgtEl>
+                    <p:sldTgt/>
+                  </p:tgtEl>
+                </p:cond>
+              </p:nextCondLst>
+            </p:seq>
+          </p:childTnLst>
+        </p:cTn>
       </p:par>
     </p:tnLst>
   </p:timing>
@@ -7496,7 +10797,7 @@
           <a:graphicData uri="http://schemas.openxmlformats.org/presentationml/2006/ole">
             <mc:AlternateContent xmlns:mc="http://schemas.openxmlformats.org/markup-compatibility/2006">
               <mc:Choice xmlns:v="urn:schemas-microsoft-com:vml" Requires="v">
-                <p:oleObj spid="_x0000_s5173" name="Visio" r:id="rId3" imgW="5647703" imgH="4284926" progId="Visio.Drawing.11">
+                <p:oleObj spid="_x0000_s5213" name="Visio" r:id="rId3" imgW="5647703" imgH="4284926" progId="Visio.Drawing.11">
                   <p:embed/>
                 </p:oleObj>
               </mc:Choice>
@@ -7589,7 +10890,7 @@
           <a:graphicData uri="http://schemas.openxmlformats.org/presentationml/2006/ole">
             <mc:AlternateContent xmlns:mc="http://schemas.openxmlformats.org/markup-compatibility/2006">
               <mc:Choice xmlns:v="urn:schemas-microsoft-com:vml" Requires="v">
-                <p:oleObj spid="_x0000_s5174" name="Visio" r:id="rId5" imgW="5647703" imgH="4300042" progId="Visio.Drawing.11">
+                <p:oleObj spid="_x0000_s5214" name="Visio" r:id="rId5" imgW="5647703" imgH="4300042" progId="Visio.Drawing.11">
                   <p:embed/>
                 </p:oleObj>
               </mc:Choice>
@@ -7682,7 +10983,7 @@
           <a:graphicData uri="http://schemas.openxmlformats.org/presentationml/2006/ole">
             <mc:AlternateContent xmlns:mc="http://schemas.openxmlformats.org/markup-compatibility/2006">
               <mc:Choice xmlns:v="urn:schemas-microsoft-com:vml" Requires="v">
-                <p:oleObj spid="_x0000_s5175" name="Visio" r:id="rId7" imgW="5647703" imgH="4300042" progId="Visio.Drawing.11">
+                <p:oleObj spid="_x0000_s5215" name="Visio" r:id="rId7" imgW="5647703" imgH="4300042" progId="Visio.Drawing.11">
                   <p:embed/>
                 </p:oleObj>
               </mc:Choice>
@@ -7775,7 +11076,7 @@
           <a:graphicData uri="http://schemas.openxmlformats.org/presentationml/2006/ole">
             <mc:AlternateContent xmlns:mc="http://schemas.openxmlformats.org/markup-compatibility/2006">
               <mc:Choice xmlns:v="urn:schemas-microsoft-com:vml" Requires="v">
-                <p:oleObj spid="_x0000_s5176" name="Visio" r:id="rId9" imgW="5647703" imgH="4300042" progId="Visio.Drawing.11">
+                <p:oleObj spid="_x0000_s5216" name="Visio" r:id="rId9" imgW="5647703" imgH="4300042" progId="Visio.Drawing.11">
                   <p:embed/>
                 </p:oleObj>
               </mc:Choice>
@@ -7868,7 +11169,7 @@
           <a:graphicData uri="http://schemas.openxmlformats.org/presentationml/2006/ole">
             <mc:AlternateContent xmlns:mc="http://schemas.openxmlformats.org/markup-compatibility/2006">
               <mc:Choice xmlns:v="urn:schemas-microsoft-com:vml" Requires="v">
-                <p:oleObj spid="_x0000_s5177" name="Visio" r:id="rId11" imgW="5647703" imgH="4300042" progId="Visio.Drawing.11">
+                <p:oleObj spid="_x0000_s5217" name="Visio" r:id="rId11" imgW="5647703" imgH="4300042" progId="Visio.Drawing.11">
                   <p:embed/>
                 </p:oleObj>
               </mc:Choice>
@@ -7961,7 +11262,7 @@
           <a:graphicData uri="http://schemas.openxmlformats.org/presentationml/2006/ole">
             <mc:AlternateContent xmlns:mc="http://schemas.openxmlformats.org/markup-compatibility/2006">
               <mc:Choice xmlns:v="urn:schemas-microsoft-com:vml" Requires="v">
-                <p:oleObj spid="_x0000_s5178" name="Visio" r:id="rId13" imgW="5647939" imgH="4284900" progId="Visio.Drawing.11">
+                <p:oleObj spid="_x0000_s5218" name="Visio" r:id="rId13" imgW="5647939" imgH="4284900" progId="Visio.Drawing.11">
                   <p:embed/>
                 </p:oleObj>
               </mc:Choice>
@@ -8054,7 +11355,7 @@
           <a:graphicData uri="http://schemas.openxmlformats.org/presentationml/2006/ole">
             <mc:AlternateContent xmlns:mc="http://schemas.openxmlformats.org/markup-compatibility/2006">
               <mc:Choice xmlns:v="urn:schemas-microsoft-com:vml" Requires="v">
-                <p:oleObj spid="_x0000_s5179" name="Visio" r:id="rId15" imgW="5647703" imgH="4300042" progId="Visio.Drawing.11">
+                <p:oleObj spid="_x0000_s5219" name="Visio" r:id="rId15" imgW="5647703" imgH="4300042" progId="Visio.Drawing.11">
                   <p:embed/>
                 </p:oleObj>
               </mc:Choice>
@@ -8147,7 +11448,7 @@
           <a:graphicData uri="http://schemas.openxmlformats.org/presentationml/2006/ole">
             <mc:AlternateContent xmlns:mc="http://schemas.openxmlformats.org/markup-compatibility/2006">
               <mc:Choice xmlns:v="urn:schemas-microsoft-com:vml" Requires="v">
-                <p:oleObj spid="_x0000_s5180" name="Visio" r:id="rId17" imgW="5647703" imgH="4300042" progId="Visio.Drawing.11">
+                <p:oleObj spid="_x0000_s5220" name="Visio" r:id="rId17" imgW="5647703" imgH="4300042" progId="Visio.Drawing.11">
                   <p:embed/>
                 </p:oleObj>
               </mc:Choice>
@@ -8240,7 +11541,7 @@
           <a:graphicData uri="http://schemas.openxmlformats.org/presentationml/2006/ole">
             <mc:AlternateContent xmlns:mc="http://schemas.openxmlformats.org/markup-compatibility/2006">
               <mc:Choice xmlns:v="urn:schemas-microsoft-com:vml" Requires="v">
-                <p:oleObj spid="_x0000_s5181" name="Visio" r:id="rId19" imgW="5647939" imgH="4300020" progId="Visio.Drawing.11">
+                <p:oleObj spid="_x0000_s5221" name="Visio" r:id="rId19" imgW="5647939" imgH="4300020" progId="Visio.Drawing.11">
                   <p:embed/>
                 </p:oleObj>
               </mc:Choice>
@@ -8333,7 +11634,7 @@
           <a:graphicData uri="http://schemas.openxmlformats.org/presentationml/2006/ole">
             <mc:AlternateContent xmlns:mc="http://schemas.openxmlformats.org/markup-compatibility/2006">
               <mc:Choice xmlns:v="urn:schemas-microsoft-com:vml" Requires="v">
-                <p:oleObj spid="_x0000_s5182" name="Visio" r:id="rId21" imgW="5647703" imgH="4300042" progId="Visio.Drawing.11">
+                <p:oleObj spid="_x0000_s5222" name="Visio" r:id="rId21" imgW="5647703" imgH="4300042" progId="Visio.Drawing.11">
                   <p:embed/>
                 </p:oleObj>
               </mc:Choice>
@@ -9504,7 +12805,7 @@
           <a:graphicData uri="http://schemas.openxmlformats.org/presentationml/2006/ole">
             <mc:AlternateContent xmlns:mc="http://schemas.openxmlformats.org/markup-compatibility/2006">
               <mc:Choice xmlns:v="urn:schemas-microsoft-com:vml" Requires="v">
-                <p:oleObj spid="_x0000_s6152" name="Visio" r:id="rId5" imgW="5647860" imgH="4300268" progId="Visio.Drawing.11">
+                <p:oleObj spid="_x0000_s6157" name="Visio" r:id="rId5" imgW="5647860" imgH="4300268" progId="Visio.Drawing.11">
                   <p:embed/>
                 </p:oleObj>
               </mc:Choice>

</xml_diff>